<commit_message>
update pp and add examples
</commit_message>
<xml_diff>
--- a/presentation/monads.pptx
+++ b/presentation/monads.pptx
@@ -7,11 +7,13 @@
   <p:sldIdLst>
     <p:sldId id="292" r:id="rId5"/>
     <p:sldId id="311" r:id="rId6"/>
-    <p:sldId id="312" r:id="rId7"/>
-    <p:sldId id="313" r:id="rId8"/>
+    <p:sldId id="313" r:id="rId7"/>
+    <p:sldId id="312" r:id="rId8"/>
     <p:sldId id="314" r:id="rId9"/>
-    <p:sldId id="309" r:id="rId10"/>
-    <p:sldId id="310" r:id="rId11"/>
+    <p:sldId id="315" r:id="rId10"/>
+    <p:sldId id="316" r:id="rId11"/>
+    <p:sldId id="309" r:id="rId12"/>
+    <p:sldId id="310" r:id="rId13"/>
   </p:sldIdLst>
   <p:sldSz cx="12192000" cy="6858000"/>
   <p:notesSz cx="6858000" cy="9144000"/>
@@ -3599,7 +3601,7 @@
           <a:p>
             <a:fld id="{EA0C0817-A112-4847-8014-A94B7D2A4EA3}" type="datetime1">
               <a:rPr lang="en-US" smtClean="0"/>
-              <a:t>3/11/21</a:t>
+              <a:t>3/15/2021</a:t>
             </a:fld>
             <a:endParaRPr lang="en-US" dirty="0"/>
           </a:p>
@@ -3801,7 +3803,7 @@
           <a:p>
             <a:fld id="{7332B432-ACDA-4023-A761-2BAB76577B62}" type="datetime1">
               <a:rPr lang="en-US" smtClean="0"/>
-              <a:t>3/11/21</a:t>
+              <a:t>3/15/2021</a:t>
             </a:fld>
             <a:endParaRPr lang="en-US" dirty="0"/>
           </a:p>
@@ -4400,7 +4402,7 @@
           <a:p>
             <a:fld id="{D9C646AA-F36E-4540-911D-FFFC0A0EF24A}" type="datetime1">
               <a:rPr lang="en-US" smtClean="0"/>
-              <a:t>3/11/21</a:t>
+              <a:t>3/15/2021</a:t>
             </a:fld>
             <a:endParaRPr lang="en-US" dirty="0"/>
           </a:p>
@@ -4720,7 +4722,7 @@
           <a:p>
             <a:fld id="{69186D26-FA5F-4637-B602-B7C2DC34CFD4}" type="datetime1">
               <a:rPr lang="en-US" smtClean="0"/>
-              <a:t>3/11/21</a:t>
+              <a:t>3/15/2021</a:t>
             </a:fld>
             <a:endParaRPr lang="en-US" dirty="0"/>
           </a:p>
@@ -5157,7 +5159,7 @@
           <a:p>
             <a:fld id="{8A7F15D8-96D1-4781-BC50-CA8A088B2FE4}" type="datetime1">
               <a:rPr lang="en-US" smtClean="0"/>
-              <a:t>3/11/21</a:t>
+              <a:t>3/15/2021</a:t>
             </a:fld>
             <a:endParaRPr lang="en-US" dirty="0"/>
           </a:p>
@@ -5275,7 +5277,7 @@
           <a:p>
             <a:fld id="{F9A96C99-B8F8-4528-BD05-0E16E943DC09}" type="datetime1">
               <a:rPr lang="en-US" smtClean="0"/>
-              <a:t>3/11/21</a:t>
+              <a:t>3/15/2021</a:t>
             </a:fld>
             <a:endParaRPr lang="en-US" dirty="0"/>
           </a:p>
@@ -5370,7 +5372,7 @@
           <a:p>
             <a:fld id="{03636942-C211-4B28-8DBD-C953E00AF71B}" type="datetime1">
               <a:rPr lang="en-US" smtClean="0"/>
-              <a:t>3/11/21</a:t>
+              <a:t>3/15/2021</a:t>
             </a:fld>
             <a:endParaRPr lang="en-US" dirty="0"/>
           </a:p>
@@ -5787,7 +5789,7 @@
           <a:p>
             <a:fld id="{7E8D12A6-918A-48BD-8CB9-CA713993B0EA}" type="datetime1">
               <a:rPr lang="en-US" smtClean="0"/>
-              <a:t>3/11/21</a:t>
+              <a:t>3/15/2021</a:t>
             </a:fld>
             <a:endParaRPr lang="en-US" dirty="0"/>
           </a:p>
@@ -6049,7 +6051,7 @@
             <a:fld id="{E778CE86-875F-4587-BCF6-FA054AFC0D53}" type="datetime1">
               <a:rPr lang="en-US" smtClean="0"/>
               <a:pPr/>
-              <a:t>3/11/21</a:t>
+              <a:t>3/15/2021</a:t>
             </a:fld>
             <a:endParaRPr lang="en-US" dirty="0"/>
           </a:p>
@@ -6565,7 +6567,7 @@
           <a:p>
             <a:fld id="{F6FA2B21-3FCD-4721-B95C-427943F61125}" type="datetime1">
               <a:rPr lang="en-US" smtClean="0"/>
-              <a:t>3/11/21</a:t>
+              <a:t>3/15/2021</a:t>
             </a:fld>
             <a:endParaRPr lang="en-US" dirty="0"/>
           </a:p>
@@ -7376,6 +7378,1112 @@
       </p:grpSpPr>
       <p:sp>
         <p:nvSpPr>
+          <p:cNvPr id="9" name="Rectangle 8">
+            <a:extLst>
+              <a:ext uri="{FF2B5EF4-FFF2-40B4-BE49-F238E27FC236}">
+                <a16:creationId xmlns:a16="http://schemas.microsoft.com/office/drawing/2014/main" id="{904DB13E-F722-4ED6-BB00-556651E95281}"/>
+              </a:ext>
+              <a:ext uri="{C183D7F6-B498-43B3-948B-1728B52AA6E4}">
+                <adec:decorative xmlns:adec="http://schemas.microsoft.com/office/drawing/2017/decorative" val="1"/>
+              </a:ext>
+            </a:extLst>
+          </p:cNvPr>
+          <p:cNvSpPr>
+            <a:spLocks noGrp="1" noRot="1" noChangeAspect="1" noMove="1" noResize="1" noEditPoints="1" noAdjustHandles="1" noChangeArrowheads="1" noChangeShapeType="1" noTextEdit="1"/>
+          </p:cNvSpPr>
+          <p:nvPr>
+            <p:extLst>
+              <p:ext uri="{386F3935-93C4-4BCD-93E2-E3B085C9AB24}">
+                <p16:designElem xmlns:p16="http://schemas.microsoft.com/office/powerpoint/2015/main" val="1"/>
+              </p:ext>
+            </p:extLst>
+          </p:nvPr>
+        </p:nvSpPr>
+        <p:spPr>
+          <a:xfrm>
+            <a:off x="0" y="0"/>
+            <a:ext cx="12192000" cy="6858000"/>
+          </a:xfrm>
+          <a:prstGeom prst="rect">
+            <a:avLst/>
+          </a:prstGeom>
+          <a:solidFill>
+            <a:schemeClr val="tx1">
+              <a:lumMod val="65000"/>
+              <a:lumOff val="35000"/>
+            </a:schemeClr>
+          </a:solidFill>
+          <a:ln>
+            <a:noFill/>
+          </a:ln>
+        </p:spPr>
+        <p:style>
+          <a:lnRef idx="2">
+            <a:schemeClr val="accent1">
+              <a:shade val="50000"/>
+            </a:schemeClr>
+          </a:lnRef>
+          <a:fillRef idx="1">
+            <a:schemeClr val="accent1"/>
+          </a:fillRef>
+          <a:effectRef idx="0">
+            <a:schemeClr val="accent1"/>
+          </a:effectRef>
+          <a:fontRef idx="minor">
+            <a:schemeClr val="lt1"/>
+          </a:fontRef>
+        </p:style>
+        <p:txBody>
+          <a:bodyPr rtlCol="0" anchor="ctr"/>
+          <a:lstStyle/>
+          <a:p>
+            <a:pPr algn="ctr"/>
+            <a:endParaRPr lang="en-US"/>
+          </a:p>
+        </p:txBody>
+      </p:sp>
+      <p:sp useBgFill="1">
+        <p:nvSpPr>
+          <p:cNvPr id="11" name="Rectangle 10">
+            <a:extLst>
+              <a:ext uri="{FF2B5EF4-FFF2-40B4-BE49-F238E27FC236}">
+                <a16:creationId xmlns:a16="http://schemas.microsoft.com/office/drawing/2014/main" id="{1E8D93C5-28EB-42D0-86CE-D804955653CC}"/>
+              </a:ext>
+              <a:ext uri="{C183D7F6-B498-43B3-948B-1728B52AA6E4}">
+                <adec:decorative xmlns:adec="http://schemas.microsoft.com/office/drawing/2017/decorative" val="1"/>
+              </a:ext>
+            </a:extLst>
+          </p:cNvPr>
+          <p:cNvSpPr>
+            <a:spLocks noGrp="1" noRot="1" noChangeAspect="1" noMove="1" noResize="1" noEditPoints="1" noAdjustHandles="1" noChangeArrowheads="1" noChangeShapeType="1" noTextEdit="1"/>
+          </p:cNvSpPr>
+          <p:nvPr>
+            <p:extLst>
+              <p:ext uri="{386F3935-93C4-4BCD-93E2-E3B085C9AB24}">
+                <p16:designElem xmlns:p16="http://schemas.microsoft.com/office/powerpoint/2015/main" val="1"/>
+              </p:ext>
+            </p:extLst>
+          </p:nvPr>
+        </p:nvSpPr>
+        <p:spPr>
+          <a:xfrm>
+            <a:off x="1307870" y="1267730"/>
+            <a:ext cx="9576262" cy="4307950"/>
+          </a:xfrm>
+          <a:prstGeom prst="rect">
+            <a:avLst/>
+          </a:prstGeom>
+          <a:ln w="6350" cap="flat" cmpd="sng" algn="ctr">
+            <a:noFill/>
+            <a:prstDash val="solid"/>
+          </a:ln>
+          <a:effectLst>
+            <a:outerShdw blurRad="50800" algn="ctr" rotWithShape="0">
+              <a:prstClr val="black">
+                <a:alpha val="66000"/>
+              </a:prstClr>
+            </a:outerShdw>
+            <a:softEdge rad="0"/>
+          </a:effectLst>
+        </p:spPr>
+      </p:sp>
+      <p:sp>
+        <p:nvSpPr>
+          <p:cNvPr id="13" name="Rectangle 12">
+            <a:extLst>
+              <a:ext uri="{FF2B5EF4-FFF2-40B4-BE49-F238E27FC236}">
+                <a16:creationId xmlns:a16="http://schemas.microsoft.com/office/drawing/2014/main" id="{AB1B1E7D-F76D-4744-AF85-239E6998A4C5}"/>
+              </a:ext>
+              <a:ext uri="{C183D7F6-B498-43B3-948B-1728B52AA6E4}">
+                <adec:decorative xmlns:adec="http://schemas.microsoft.com/office/drawing/2017/decorative" val="1"/>
+              </a:ext>
+            </a:extLst>
+          </p:cNvPr>
+          <p:cNvSpPr>
+            <a:spLocks noGrp="1" noRot="1" noChangeAspect="1" noMove="1" noResize="1" noEditPoints="1" noAdjustHandles="1" noChangeArrowheads="1" noChangeShapeType="1" noTextEdit="1"/>
+          </p:cNvSpPr>
+          <p:nvPr>
+            <p:extLst>
+              <p:ext uri="{386F3935-93C4-4BCD-93E2-E3B085C9AB24}">
+                <p16:designElem xmlns:p16="http://schemas.microsoft.com/office/powerpoint/2015/main" val="1"/>
+              </p:ext>
+            </p:extLst>
+          </p:nvPr>
+        </p:nvSpPr>
+        <p:spPr>
+          <a:xfrm>
+            <a:off x="1447801" y="1411615"/>
+            <a:ext cx="9296400" cy="4034770"/>
+          </a:xfrm>
+          <a:prstGeom prst="rect">
+            <a:avLst/>
+          </a:prstGeom>
+          <a:noFill/>
+          <a:ln w="6350" cap="sq" cmpd="sng" algn="ctr">
+            <a:solidFill>
+              <a:schemeClr val="tx1">
+                <a:lumMod val="75000"/>
+                <a:lumOff val="25000"/>
+              </a:schemeClr>
+            </a:solidFill>
+            <a:prstDash val="solid"/>
+            <a:miter lim="800000"/>
+          </a:ln>
+          <a:effectLst/>
+        </p:spPr>
+      </p:sp>
+      <p:sp>
+        <p:nvSpPr>
+          <p:cNvPr id="15" name="Rectangle 14">
+            <a:extLst>
+              <a:ext uri="{FF2B5EF4-FFF2-40B4-BE49-F238E27FC236}">
+                <a16:creationId xmlns:a16="http://schemas.microsoft.com/office/drawing/2014/main" id="{3BB65211-00DB-45B6-A223-033B2D19CBE8}"/>
+              </a:ext>
+              <a:ext uri="{C183D7F6-B498-43B3-948B-1728B52AA6E4}">
+                <adec:decorative xmlns:adec="http://schemas.microsoft.com/office/drawing/2017/decorative" val="1"/>
+              </a:ext>
+            </a:extLst>
+          </p:cNvPr>
+          <p:cNvSpPr>
+            <a:spLocks noGrp="1" noRot="1" noChangeAspect="1" noMove="1" noResize="1" noEditPoints="1" noAdjustHandles="1" noChangeArrowheads="1" noChangeShapeType="1" noTextEdit="1"/>
+          </p:cNvSpPr>
+          <p:nvPr>
+            <p:extLst>
+              <p:ext uri="{386F3935-93C4-4BCD-93E2-E3B085C9AB24}">
+                <p16:designElem xmlns:p16="http://schemas.microsoft.com/office/powerpoint/2015/main" val="1"/>
+              </p:ext>
+            </p:extLst>
+          </p:nvPr>
+        </p:nvSpPr>
+        <p:spPr>
+          <a:xfrm>
+            <a:off x="5135880" y="1267730"/>
+            <a:ext cx="1920240" cy="731520"/>
+          </a:xfrm>
+          <a:prstGeom prst="rect">
+            <a:avLst/>
+          </a:prstGeom>
+          <a:solidFill>
+            <a:schemeClr val="accent1"/>
+          </a:solidFill>
+          <a:ln>
+            <a:noFill/>
+          </a:ln>
+        </p:spPr>
+        <p:style>
+          <a:lnRef idx="2">
+            <a:schemeClr val="accent1">
+              <a:shade val="50000"/>
+            </a:schemeClr>
+          </a:lnRef>
+          <a:fillRef idx="1">
+            <a:schemeClr val="accent1"/>
+          </a:fillRef>
+          <a:effectRef idx="0">
+            <a:schemeClr val="accent1"/>
+          </a:effectRef>
+          <a:fontRef idx="minor">
+            <a:schemeClr val="lt1"/>
+          </a:fontRef>
+        </p:style>
+      </p:sp>
+      <p:grpSp>
+        <p:nvGrpSpPr>
+          <p:cNvPr id="17" name="Group 16">
+            <a:extLst>
+              <a:ext uri="{FF2B5EF4-FFF2-40B4-BE49-F238E27FC236}">
+                <a16:creationId xmlns:a16="http://schemas.microsoft.com/office/drawing/2014/main" id="{E26428D7-C6F3-473D-A360-A3F5C3E8728C}"/>
+              </a:ext>
+              <a:ext uri="{C183D7F6-B498-43B3-948B-1728B52AA6E4}">
+                <adec:decorative xmlns:adec="http://schemas.microsoft.com/office/drawing/2017/decorative" val="1"/>
+              </a:ext>
+            </a:extLst>
+          </p:cNvPr>
+          <p:cNvGrpSpPr>
+            <a:grpSpLocks noGrp="1" noUngrp="1" noRot="1" noChangeAspect="1" noMove="1" noResize="1"/>
+          </p:cNvGrpSpPr>
+          <p:nvPr>
+            <p:extLst>
+              <p:ext uri="{386F3935-93C4-4BCD-93E2-E3B085C9AB24}">
+                <p16:designElem xmlns:p16="http://schemas.microsoft.com/office/powerpoint/2015/main" val="1"/>
+              </p:ext>
+            </p:extLst>
+          </p:nvPr>
+        </p:nvGrpSpPr>
+        <p:grpSpPr>
+          <a:xfrm>
+            <a:off x="5250180" y="1267730"/>
+            <a:ext cx="1691640" cy="615934"/>
+            <a:chOff x="5250180" y="1267730"/>
+            <a:chExt cx="1691640" cy="615934"/>
+          </a:xfrm>
+        </p:grpSpPr>
+        <p:cxnSp>
+          <p:nvCxnSpPr>
+            <p:cNvPr id="18" name="Straight Connector 17">
+              <a:extLst>
+                <a:ext uri="{FF2B5EF4-FFF2-40B4-BE49-F238E27FC236}">
+                  <a16:creationId xmlns:a16="http://schemas.microsoft.com/office/drawing/2014/main" id="{14DF524F-3FEF-4236-90C6-820E876A94EE}"/>
+                </a:ext>
+                <a:ext uri="{C183D7F6-B498-43B3-948B-1728B52AA6E4}">
+                  <adec:decorative xmlns:adec="http://schemas.microsoft.com/office/drawing/2017/decorative" val="1"/>
+                </a:ext>
+              </a:extLst>
+            </p:cNvPr>
+            <p:cNvCxnSpPr/>
+            <p:nvPr>
+              <p:extLst>
+                <p:ext uri="{386F3935-93C4-4BCD-93E2-E3B085C9AB24}">
+                  <p16:designElem xmlns:p16="http://schemas.microsoft.com/office/powerpoint/2015/main" val="1"/>
+                </p:ext>
+              </p:extLst>
+            </p:nvPr>
+          </p:nvCxnSpPr>
+          <p:spPr>
+            <a:xfrm>
+              <a:off x="5250180" y="1267730"/>
+              <a:ext cx="0" cy="612648"/>
+            </a:xfrm>
+            <a:prstGeom prst="line">
+              <a:avLst/>
+            </a:prstGeom>
+            <a:solidFill>
+              <a:schemeClr val="tx1">
+                <a:lumMod val="85000"/>
+                <a:lumOff val="15000"/>
+              </a:schemeClr>
+            </a:solidFill>
+            <a:ln>
+              <a:solidFill>
+                <a:srgbClr val="FFFFFF"/>
+              </a:solidFill>
+              <a:miter lim="800000"/>
+            </a:ln>
+          </p:spPr>
+          <p:style>
+            <a:lnRef idx="1">
+              <a:schemeClr val="accent1"/>
+            </a:lnRef>
+            <a:fillRef idx="0">
+              <a:schemeClr val="accent1"/>
+            </a:fillRef>
+            <a:effectRef idx="0">
+              <a:schemeClr val="accent1"/>
+            </a:effectRef>
+            <a:fontRef idx="minor">
+              <a:schemeClr val="tx1"/>
+            </a:fontRef>
+          </p:style>
+        </p:cxnSp>
+        <p:cxnSp>
+          <p:nvCxnSpPr>
+            <p:cNvPr id="19" name="Straight Connector 18">
+              <a:extLst>
+                <a:ext uri="{FF2B5EF4-FFF2-40B4-BE49-F238E27FC236}">
+                  <a16:creationId xmlns:a16="http://schemas.microsoft.com/office/drawing/2014/main" id="{2400A003-1BE9-49C2-8E57-DCD9B870FC8A}"/>
+                </a:ext>
+                <a:ext uri="{C183D7F6-B498-43B3-948B-1728B52AA6E4}">
+                  <adec:decorative xmlns:adec="http://schemas.microsoft.com/office/drawing/2017/decorative" val="1"/>
+                </a:ext>
+              </a:extLst>
+            </p:cNvPr>
+            <p:cNvCxnSpPr/>
+            <p:nvPr>
+              <p:extLst>
+                <p:ext uri="{386F3935-93C4-4BCD-93E2-E3B085C9AB24}">
+                  <p16:designElem xmlns:p16="http://schemas.microsoft.com/office/powerpoint/2015/main" val="1"/>
+                </p:ext>
+              </p:extLst>
+            </p:nvPr>
+          </p:nvCxnSpPr>
+          <p:spPr>
+            <a:xfrm>
+              <a:off x="6941820" y="1267730"/>
+              <a:ext cx="0" cy="612648"/>
+            </a:xfrm>
+            <a:prstGeom prst="line">
+              <a:avLst/>
+            </a:prstGeom>
+            <a:solidFill>
+              <a:schemeClr val="tx1">
+                <a:lumMod val="85000"/>
+                <a:lumOff val="15000"/>
+              </a:schemeClr>
+            </a:solidFill>
+            <a:ln>
+              <a:solidFill>
+                <a:srgbClr val="FFFFFF"/>
+              </a:solidFill>
+              <a:miter lim="800000"/>
+            </a:ln>
+          </p:spPr>
+          <p:style>
+            <a:lnRef idx="1">
+              <a:schemeClr val="accent1"/>
+            </a:lnRef>
+            <a:fillRef idx="0">
+              <a:schemeClr val="accent1"/>
+            </a:fillRef>
+            <a:effectRef idx="0">
+              <a:schemeClr val="accent1"/>
+            </a:effectRef>
+            <a:fontRef idx="minor">
+              <a:schemeClr val="tx1"/>
+            </a:fontRef>
+          </p:style>
+        </p:cxnSp>
+        <p:cxnSp>
+          <p:nvCxnSpPr>
+            <p:cNvPr id="20" name="Straight Connector 19">
+              <a:extLst>
+                <a:ext uri="{FF2B5EF4-FFF2-40B4-BE49-F238E27FC236}">
+                  <a16:creationId xmlns:a16="http://schemas.microsoft.com/office/drawing/2014/main" id="{83BF0991-F9A1-4282-99DB-92D70239F6A9}"/>
+                </a:ext>
+                <a:ext uri="{C183D7F6-B498-43B3-948B-1728B52AA6E4}">
+                  <adec:decorative xmlns:adec="http://schemas.microsoft.com/office/drawing/2017/decorative" val="1"/>
+                </a:ext>
+              </a:extLst>
+            </p:cNvPr>
+            <p:cNvCxnSpPr/>
+            <p:nvPr>
+              <p:extLst>
+                <p:ext uri="{386F3935-93C4-4BCD-93E2-E3B085C9AB24}">
+                  <p16:designElem xmlns:p16="http://schemas.microsoft.com/office/powerpoint/2015/main" val="1"/>
+                </p:ext>
+              </p:extLst>
+            </p:nvPr>
+          </p:nvCxnSpPr>
+          <p:spPr>
+            <a:xfrm>
+              <a:off x="5250180" y="1883664"/>
+              <a:ext cx="1691640" cy="0"/>
+            </a:xfrm>
+            <a:prstGeom prst="line">
+              <a:avLst/>
+            </a:prstGeom>
+            <a:solidFill>
+              <a:schemeClr val="tx1">
+                <a:lumMod val="85000"/>
+                <a:lumOff val="15000"/>
+              </a:schemeClr>
+            </a:solidFill>
+            <a:ln>
+              <a:solidFill>
+                <a:srgbClr val="FFFFFF"/>
+              </a:solidFill>
+              <a:miter lim="800000"/>
+            </a:ln>
+          </p:spPr>
+          <p:style>
+            <a:lnRef idx="1">
+              <a:schemeClr val="accent1"/>
+            </a:lnRef>
+            <a:fillRef idx="0">
+              <a:schemeClr val="accent1"/>
+            </a:fillRef>
+            <a:effectRef idx="0">
+              <a:schemeClr val="accent1"/>
+            </a:effectRef>
+            <a:fontRef idx="minor">
+              <a:schemeClr val="tx1"/>
+            </a:fontRef>
+          </p:style>
+        </p:cxnSp>
+      </p:grpSp>
+      <p:sp>
+        <p:nvSpPr>
+          <p:cNvPr id="22" name="Rectangle 21">
+            <a:extLst>
+              <a:ext uri="{FF2B5EF4-FFF2-40B4-BE49-F238E27FC236}">
+                <a16:creationId xmlns:a16="http://schemas.microsoft.com/office/drawing/2014/main" id="{9891C27D-8C9D-415C-A639-23D76B7B1C1D}"/>
+              </a:ext>
+              <a:ext uri="{C183D7F6-B498-43B3-948B-1728B52AA6E4}">
+                <adec:decorative xmlns:adec="http://schemas.microsoft.com/office/drawing/2017/decorative" val="1"/>
+              </a:ext>
+            </a:extLst>
+          </p:cNvPr>
+          <p:cNvSpPr>
+            <a:spLocks noGrp="1" noRot="1" noChangeAspect="1" noMove="1" noResize="1" noEditPoints="1" noAdjustHandles="1" noChangeArrowheads="1" noChangeShapeType="1" noTextEdit="1"/>
+          </p:cNvSpPr>
+          <p:nvPr>
+            <p:extLst>
+              <p:ext uri="{386F3935-93C4-4BCD-93E2-E3B085C9AB24}">
+                <p16:designElem xmlns:p16="http://schemas.microsoft.com/office/powerpoint/2015/main" val="1"/>
+              </p:ext>
+            </p:extLst>
+          </p:nvPr>
+        </p:nvSpPr>
+        <p:spPr>
+          <a:xfrm>
+            <a:off x="0" y="0"/>
+            <a:ext cx="12192000" cy="6858000"/>
+          </a:xfrm>
+          <a:prstGeom prst="rect">
+            <a:avLst/>
+          </a:prstGeom>
+          <a:solidFill>
+            <a:schemeClr val="bg1"/>
+          </a:solidFill>
+          <a:ln>
+            <a:noFill/>
+          </a:ln>
+        </p:spPr>
+        <p:style>
+          <a:lnRef idx="2">
+            <a:schemeClr val="accent1">
+              <a:shade val="50000"/>
+            </a:schemeClr>
+          </a:lnRef>
+          <a:fillRef idx="1">
+            <a:schemeClr val="accent1"/>
+          </a:fillRef>
+          <a:effectRef idx="0">
+            <a:schemeClr val="accent1"/>
+          </a:effectRef>
+          <a:fontRef idx="minor">
+            <a:schemeClr val="lt1"/>
+          </a:fontRef>
+        </p:style>
+        <p:txBody>
+          <a:bodyPr rtlCol="0" anchor="ctr"/>
+          <a:lstStyle/>
+          <a:p>
+            <a:pPr algn="ctr"/>
+            <a:endParaRPr lang="en-US"/>
+          </a:p>
+        </p:txBody>
+      </p:sp>
+      <p:sp>
+        <p:nvSpPr>
+          <p:cNvPr id="24" name="Rectangle 23">
+            <a:extLst>
+              <a:ext uri="{FF2B5EF4-FFF2-40B4-BE49-F238E27FC236}">
+                <a16:creationId xmlns:a16="http://schemas.microsoft.com/office/drawing/2014/main" id="{E8F4C0D6-B7E0-42D0-A57F-6781017A2164}"/>
+              </a:ext>
+              <a:ext uri="{C183D7F6-B498-43B3-948B-1728B52AA6E4}">
+                <adec:decorative xmlns:adec="http://schemas.microsoft.com/office/drawing/2017/decorative" val="1"/>
+              </a:ext>
+            </a:extLst>
+          </p:cNvPr>
+          <p:cNvSpPr>
+            <a:spLocks noGrp="1" noRot="1" noChangeAspect="1" noMove="1" noResize="1" noEditPoints="1" noAdjustHandles="1" noChangeArrowheads="1" noChangeShapeType="1" noTextEdit="1"/>
+          </p:cNvSpPr>
+          <p:nvPr>
+            <p:extLst>
+              <p:ext uri="{386F3935-93C4-4BCD-93E2-E3B085C9AB24}">
+                <p16:designElem xmlns:p16="http://schemas.microsoft.com/office/powerpoint/2015/main" val="1"/>
+              </p:ext>
+            </p:extLst>
+          </p:nvPr>
+        </p:nvSpPr>
+        <p:spPr>
+          <a:xfrm>
+            <a:off x="0" y="0"/>
+            <a:ext cx="12192000" cy="6858000"/>
+          </a:xfrm>
+          <a:prstGeom prst="rect">
+            <a:avLst/>
+          </a:prstGeom>
+          <a:solidFill>
+            <a:schemeClr val="bg1">
+              <a:lumMod val="75000"/>
+              <a:lumOff val="25000"/>
+            </a:schemeClr>
+          </a:solidFill>
+          <a:ln>
+            <a:noFill/>
+          </a:ln>
+        </p:spPr>
+        <p:style>
+          <a:lnRef idx="2">
+            <a:schemeClr val="accent1">
+              <a:shade val="50000"/>
+            </a:schemeClr>
+          </a:lnRef>
+          <a:fillRef idx="1002">
+            <a:schemeClr val="lt2"/>
+          </a:fillRef>
+          <a:effectRef idx="0">
+            <a:schemeClr val="accent1"/>
+          </a:effectRef>
+          <a:fontRef idx="minor">
+            <a:schemeClr val="lt1"/>
+          </a:fontRef>
+        </p:style>
+        <p:txBody>
+          <a:bodyPr rtlCol="0" anchor="ctr"/>
+          <a:lstStyle/>
+          <a:p>
+            <a:pPr algn="ctr"/>
+            <a:endParaRPr lang="en-US" dirty="0"/>
+          </a:p>
+        </p:txBody>
+      </p:sp>
+      <p:sp>
+        <p:nvSpPr>
+          <p:cNvPr id="26" name="Rectangle 25">
+            <a:extLst>
+              <a:ext uri="{FF2B5EF4-FFF2-40B4-BE49-F238E27FC236}">
+                <a16:creationId xmlns:a16="http://schemas.microsoft.com/office/drawing/2014/main" id="{5B4D6D08-A7F1-4445-BA2E-E449562C04C1}"/>
+              </a:ext>
+              <a:ext uri="{C183D7F6-B498-43B3-948B-1728B52AA6E4}">
+                <adec:decorative xmlns:adec="http://schemas.microsoft.com/office/drawing/2017/decorative" val="1"/>
+              </a:ext>
+            </a:extLst>
+          </p:cNvPr>
+          <p:cNvSpPr>
+            <a:spLocks noGrp="1" noRot="1" noChangeAspect="1" noMove="1" noResize="1" noEditPoints="1" noAdjustHandles="1" noChangeArrowheads="1" noChangeShapeType="1" noTextEdit="1"/>
+          </p:cNvSpPr>
+          <p:nvPr>
+            <p:extLst>
+              <p:ext uri="{386F3935-93C4-4BCD-93E2-E3B085C9AB24}">
+                <p16:designElem xmlns:p16="http://schemas.microsoft.com/office/powerpoint/2015/main" val="1"/>
+              </p:ext>
+            </p:extLst>
+          </p:nvPr>
+        </p:nvSpPr>
+        <p:spPr>
+          <a:xfrm>
+            <a:off x="-1867" y="0"/>
+            <a:ext cx="8168743" cy="6858000"/>
+          </a:xfrm>
+          <a:prstGeom prst="rect">
+            <a:avLst/>
+          </a:prstGeom>
+          <a:solidFill>
+            <a:schemeClr val="tx1">
+              <a:lumMod val="85000"/>
+            </a:schemeClr>
+          </a:solidFill>
+          <a:ln>
+            <a:noFill/>
+          </a:ln>
+        </p:spPr>
+        <p:style>
+          <a:lnRef idx="2">
+            <a:schemeClr val="accent1">
+              <a:shade val="50000"/>
+            </a:schemeClr>
+          </a:lnRef>
+          <a:fillRef idx="1">
+            <a:schemeClr val="accent1"/>
+          </a:fillRef>
+          <a:effectRef idx="0">
+            <a:schemeClr val="accent1"/>
+          </a:effectRef>
+          <a:fontRef idx="minor">
+            <a:schemeClr val="lt1"/>
+          </a:fontRef>
+        </p:style>
+        <p:txBody>
+          <a:bodyPr rtlCol="0" anchor="ctr"/>
+          <a:lstStyle/>
+          <a:p>
+            <a:pPr algn="ctr"/>
+            <a:endParaRPr lang="en-US"/>
+          </a:p>
+        </p:txBody>
+      </p:sp>
+      <p:sp>
+        <p:nvSpPr>
+          <p:cNvPr id="28" name="Rectangle 27">
+            <a:extLst>
+              <a:ext uri="{FF2B5EF4-FFF2-40B4-BE49-F238E27FC236}">
+                <a16:creationId xmlns:a16="http://schemas.microsoft.com/office/drawing/2014/main" id="{3A7C1A41-D915-4D26-8D5E-C01B27160A80}"/>
+              </a:ext>
+              <a:ext uri="{C183D7F6-B498-43B3-948B-1728B52AA6E4}">
+                <adec:decorative xmlns:adec="http://schemas.microsoft.com/office/drawing/2017/decorative" val="1"/>
+              </a:ext>
+            </a:extLst>
+          </p:cNvPr>
+          <p:cNvSpPr>
+            <a:spLocks noGrp="1" noRot="1" noChangeAspect="1" noMove="1" noResize="1" noEditPoints="1" noAdjustHandles="1" noChangeArrowheads="1" noChangeShapeType="1" noTextEdit="1"/>
+          </p:cNvSpPr>
+          <p:nvPr>
+            <p:extLst>
+              <p:ext uri="{386F3935-93C4-4BCD-93E2-E3B085C9AB24}">
+                <p16:designElem xmlns:p16="http://schemas.microsoft.com/office/powerpoint/2015/main" val="1"/>
+              </p:ext>
+            </p:extLst>
+          </p:nvPr>
+        </p:nvSpPr>
+        <p:spPr>
+          <a:xfrm>
+            <a:off x="643337" y="643464"/>
+            <a:ext cx="6909241" cy="5571072"/>
+          </a:xfrm>
+          <a:prstGeom prst="rect">
+            <a:avLst/>
+          </a:prstGeom>
+          <a:solidFill>
+            <a:srgbClr val="FFFFFF"/>
+          </a:solidFill>
+          <a:ln w="6350" cap="flat" cmpd="sng" algn="ctr">
+            <a:noFill/>
+            <a:prstDash val="solid"/>
+          </a:ln>
+          <a:effectLst>
+            <a:outerShdw blurRad="50800" algn="ctr" rotWithShape="0">
+              <a:prstClr val="black">
+                <a:alpha val="66000"/>
+              </a:prstClr>
+            </a:outerShdw>
+            <a:softEdge rad="0"/>
+          </a:effectLst>
+        </p:spPr>
+      </p:sp>
+      <p:sp>
+        <p:nvSpPr>
+          <p:cNvPr id="30" name="Rectangle 29">
+            <a:extLst>
+              <a:ext uri="{FF2B5EF4-FFF2-40B4-BE49-F238E27FC236}">
+                <a16:creationId xmlns:a16="http://schemas.microsoft.com/office/drawing/2014/main" id="{A50B663E-F671-4504-99A8-4559554692B0}"/>
+              </a:ext>
+              <a:ext uri="{C183D7F6-B498-43B3-948B-1728B52AA6E4}">
+                <adec:decorative xmlns:adec="http://schemas.microsoft.com/office/drawing/2017/decorative" val="1"/>
+              </a:ext>
+            </a:extLst>
+          </p:cNvPr>
+          <p:cNvSpPr>
+            <a:spLocks noGrp="1" noRot="1" noChangeAspect="1" noMove="1" noResize="1" noEditPoints="1" noAdjustHandles="1" noChangeArrowheads="1" noChangeShapeType="1" noTextEdit="1"/>
+          </p:cNvSpPr>
+          <p:nvPr>
+            <p:extLst>
+              <p:ext uri="{386F3935-93C4-4BCD-93E2-E3B085C9AB24}">
+                <p16:designElem xmlns:p16="http://schemas.microsoft.com/office/powerpoint/2015/main" val="1"/>
+              </p:ext>
+            </p:extLst>
+          </p:nvPr>
+        </p:nvSpPr>
+        <p:spPr>
+          <a:xfrm>
+            <a:off x="811227" y="805446"/>
+            <a:ext cx="6570161" cy="5244497"/>
+          </a:xfrm>
+          <a:prstGeom prst="rect">
+            <a:avLst/>
+          </a:prstGeom>
+          <a:noFill/>
+          <a:ln w="6350" cap="sq" cmpd="sng" algn="ctr">
+            <a:solidFill>
+              <a:srgbClr val="404040"/>
+            </a:solidFill>
+            <a:prstDash val="solid"/>
+            <a:miter lim="800000"/>
+          </a:ln>
+          <a:effectLst/>
+        </p:spPr>
+      </p:sp>
+      <p:sp>
+        <p:nvSpPr>
+          <p:cNvPr id="32" name="Rectangle 31">
+            <a:extLst>
+              <a:ext uri="{FF2B5EF4-FFF2-40B4-BE49-F238E27FC236}">
+                <a16:creationId xmlns:a16="http://schemas.microsoft.com/office/drawing/2014/main" id="{2EF89585-ECD6-4B38-96B1-AD41A1BD4BE1}"/>
+              </a:ext>
+              <a:ext uri="{C183D7F6-B498-43B3-948B-1728B52AA6E4}">
+                <adec:decorative xmlns:adec="http://schemas.microsoft.com/office/drawing/2017/decorative" val="1"/>
+              </a:ext>
+            </a:extLst>
+          </p:cNvPr>
+          <p:cNvSpPr>
+            <a:spLocks noGrp="1" noRot="1" noChangeAspect="1" noMove="1" noResize="1" noEditPoints="1" noAdjustHandles="1" noChangeArrowheads="1" noChangeShapeType="1" noTextEdit="1"/>
+          </p:cNvSpPr>
+          <p:nvPr>
+            <p:extLst>
+              <p:ext uri="{386F3935-93C4-4BCD-93E2-E3B085C9AB24}">
+                <p16:designElem xmlns:p16="http://schemas.microsoft.com/office/powerpoint/2015/main" val="1"/>
+              </p:ext>
+            </p:extLst>
+          </p:nvPr>
+        </p:nvSpPr>
+        <p:spPr>
+          <a:xfrm>
+            <a:off x="3137837" y="640856"/>
+            <a:ext cx="1920240" cy="731520"/>
+          </a:xfrm>
+          <a:prstGeom prst="rect">
+            <a:avLst/>
+          </a:prstGeom>
+          <a:solidFill>
+            <a:schemeClr val="accent1"/>
+          </a:solidFill>
+          <a:ln>
+            <a:noFill/>
+          </a:ln>
+        </p:spPr>
+        <p:style>
+          <a:lnRef idx="2">
+            <a:schemeClr val="accent1">
+              <a:shade val="50000"/>
+            </a:schemeClr>
+          </a:lnRef>
+          <a:fillRef idx="1">
+            <a:schemeClr val="accent1"/>
+          </a:fillRef>
+          <a:effectRef idx="0">
+            <a:schemeClr val="accent1"/>
+          </a:effectRef>
+          <a:fontRef idx="minor">
+            <a:schemeClr val="lt1"/>
+          </a:fontRef>
+        </p:style>
+      </p:sp>
+      <p:cxnSp>
+        <p:nvCxnSpPr>
+          <p:cNvPr id="34" name="Straight Connector 33">
+            <a:extLst>
+              <a:ext uri="{FF2B5EF4-FFF2-40B4-BE49-F238E27FC236}">
+                <a16:creationId xmlns:a16="http://schemas.microsoft.com/office/drawing/2014/main" id="{1B6FCD50-3FE8-4AB2-B746-2CC0EA9D4074}"/>
+              </a:ext>
+              <a:ext uri="{C183D7F6-B498-43B3-948B-1728B52AA6E4}">
+                <adec:decorative xmlns:adec="http://schemas.microsoft.com/office/drawing/2017/decorative" val="1"/>
+              </a:ext>
+            </a:extLst>
+          </p:cNvPr>
+          <p:cNvCxnSpPr>
+            <a:cxnSpLocks noGrp="1" noRot="1" noChangeAspect="1" noMove="1" noResize="1" noEditPoints="1" noAdjustHandles="1" noChangeArrowheads="1" noChangeShapeType="1"/>
+          </p:cNvCxnSpPr>
+          <p:nvPr>
+            <p:extLst>
+              <p:ext uri="{386F3935-93C4-4BCD-93E2-E3B085C9AB24}">
+                <p16:designElem xmlns:p16="http://schemas.microsoft.com/office/powerpoint/2015/main" val="1"/>
+              </p:ext>
+            </p:extLst>
+          </p:nvPr>
+        </p:nvCxnSpPr>
+        <p:spPr>
+          <a:xfrm>
+            <a:off x="3252137" y="640855"/>
+            <a:ext cx="0" cy="640080"/>
+          </a:xfrm>
+          <a:prstGeom prst="line">
+            <a:avLst/>
+          </a:prstGeom>
+          <a:solidFill>
+            <a:schemeClr val="tx1">
+              <a:lumMod val="85000"/>
+              <a:lumOff val="15000"/>
+            </a:schemeClr>
+          </a:solidFill>
+          <a:ln>
+            <a:solidFill>
+              <a:srgbClr val="FFFFFF"/>
+            </a:solidFill>
+            <a:miter lim="800000"/>
+          </a:ln>
+        </p:spPr>
+        <p:style>
+          <a:lnRef idx="1">
+            <a:schemeClr val="accent1"/>
+          </a:lnRef>
+          <a:fillRef idx="0">
+            <a:schemeClr val="accent1"/>
+          </a:fillRef>
+          <a:effectRef idx="0">
+            <a:schemeClr val="accent1"/>
+          </a:effectRef>
+          <a:fontRef idx="minor">
+            <a:schemeClr val="tx1"/>
+          </a:fontRef>
+        </p:style>
+      </p:cxnSp>
+      <p:cxnSp>
+        <p:nvCxnSpPr>
+          <p:cNvPr id="36" name="Straight Connector 35">
+            <a:extLst>
+              <a:ext uri="{FF2B5EF4-FFF2-40B4-BE49-F238E27FC236}">
+                <a16:creationId xmlns:a16="http://schemas.microsoft.com/office/drawing/2014/main" id="{B3E90108-E441-4AF0-A059-613D076C7CDA}"/>
+              </a:ext>
+              <a:ext uri="{C183D7F6-B498-43B3-948B-1728B52AA6E4}">
+                <adec:decorative xmlns:adec="http://schemas.microsoft.com/office/drawing/2017/decorative" val="1"/>
+              </a:ext>
+            </a:extLst>
+          </p:cNvPr>
+          <p:cNvCxnSpPr>
+            <a:cxnSpLocks noGrp="1" noRot="1" noChangeAspect="1" noMove="1" noResize="1" noEditPoints="1" noAdjustHandles="1" noChangeArrowheads="1" noChangeShapeType="1"/>
+          </p:cNvCxnSpPr>
+          <p:nvPr>
+            <p:extLst>
+              <p:ext uri="{386F3935-93C4-4BCD-93E2-E3B085C9AB24}">
+                <p16:designElem xmlns:p16="http://schemas.microsoft.com/office/powerpoint/2015/main" val="1"/>
+              </p:ext>
+            </p:extLst>
+          </p:nvPr>
+        </p:nvCxnSpPr>
+        <p:spPr>
+          <a:xfrm>
+            <a:off x="4943777" y="640855"/>
+            <a:ext cx="0" cy="640080"/>
+          </a:xfrm>
+          <a:prstGeom prst="line">
+            <a:avLst/>
+          </a:prstGeom>
+          <a:solidFill>
+            <a:schemeClr val="tx1">
+              <a:lumMod val="85000"/>
+              <a:lumOff val="15000"/>
+            </a:schemeClr>
+          </a:solidFill>
+          <a:ln>
+            <a:solidFill>
+              <a:srgbClr val="FFFFFF"/>
+            </a:solidFill>
+            <a:miter lim="800000"/>
+          </a:ln>
+        </p:spPr>
+        <p:style>
+          <a:lnRef idx="1">
+            <a:schemeClr val="accent1"/>
+          </a:lnRef>
+          <a:fillRef idx="0">
+            <a:schemeClr val="accent1"/>
+          </a:fillRef>
+          <a:effectRef idx="0">
+            <a:schemeClr val="accent1"/>
+          </a:effectRef>
+          <a:fontRef idx="minor">
+            <a:schemeClr val="tx1"/>
+          </a:fontRef>
+        </p:style>
+      </p:cxnSp>
+      <p:cxnSp>
+        <p:nvCxnSpPr>
+          <p:cNvPr id="38" name="Straight Connector 37">
+            <a:extLst>
+              <a:ext uri="{FF2B5EF4-FFF2-40B4-BE49-F238E27FC236}">
+                <a16:creationId xmlns:a16="http://schemas.microsoft.com/office/drawing/2014/main" id="{0B422045-789A-442D-9E39-6FC4EC452C4C}"/>
+              </a:ext>
+              <a:ext uri="{C183D7F6-B498-43B3-948B-1728B52AA6E4}">
+                <adec:decorative xmlns:adec="http://schemas.microsoft.com/office/drawing/2017/decorative" val="1"/>
+              </a:ext>
+            </a:extLst>
+          </p:cNvPr>
+          <p:cNvCxnSpPr>
+            <a:cxnSpLocks noGrp="1" noRot="1" noChangeAspect="1" noMove="1" noResize="1" noEditPoints="1" noAdjustHandles="1" noChangeArrowheads="1" noChangeShapeType="1"/>
+          </p:cNvCxnSpPr>
+          <p:nvPr>
+            <p:extLst>
+              <p:ext uri="{386F3935-93C4-4BCD-93E2-E3B085C9AB24}">
+                <p16:designElem xmlns:p16="http://schemas.microsoft.com/office/powerpoint/2015/main" val="1"/>
+              </p:ext>
+            </p:extLst>
+          </p:nvPr>
+        </p:nvCxnSpPr>
+        <p:spPr>
+          <a:xfrm>
+            <a:off x="3252137" y="1286150"/>
+            <a:ext cx="1691640" cy="0"/>
+          </a:xfrm>
+          <a:prstGeom prst="line">
+            <a:avLst/>
+          </a:prstGeom>
+          <a:solidFill>
+            <a:schemeClr val="tx1">
+              <a:lumMod val="85000"/>
+              <a:lumOff val="15000"/>
+            </a:schemeClr>
+          </a:solidFill>
+          <a:ln>
+            <a:solidFill>
+              <a:srgbClr val="FFFFFF"/>
+            </a:solidFill>
+            <a:miter lim="800000"/>
+          </a:ln>
+        </p:spPr>
+        <p:style>
+          <a:lnRef idx="1">
+            <a:schemeClr val="accent1"/>
+          </a:lnRef>
+          <a:fillRef idx="0">
+            <a:schemeClr val="accent1"/>
+          </a:fillRef>
+          <a:effectRef idx="0">
+            <a:schemeClr val="accent1"/>
+          </a:effectRef>
+          <a:fontRef idx="minor">
+            <a:schemeClr val="tx1"/>
+          </a:fontRef>
+        </p:style>
+      </p:cxnSp>
+      <p:pic>
+        <p:nvPicPr>
+          <p:cNvPr id="4" name="Content Placeholder 3">
+            <a:extLst>
+              <a:ext uri="{FF2B5EF4-FFF2-40B4-BE49-F238E27FC236}">
+                <a16:creationId xmlns:a16="http://schemas.microsoft.com/office/drawing/2014/main" id="{8ACF3DD3-8F0C-2A42-AF2E-75D3948E00F0}"/>
+              </a:ext>
+            </a:extLst>
+          </p:cNvPr>
+          <p:cNvPicPr>
+            <a:picLocks noGrp="1" noChangeAspect="1"/>
+          </p:cNvPicPr>
+          <p:nvPr>
+            <p:ph idx="1"/>
+          </p:nvPr>
+        </p:nvPicPr>
+        <p:blipFill>
+          <a:blip r:embed="rId2"/>
+          <a:stretch>
+            <a:fillRect/>
+          </a:stretch>
+        </p:blipFill>
+        <p:spPr>
+          <a:xfrm>
+            <a:off x="1295859" y="1971370"/>
+            <a:ext cx="5600897" cy="3318530"/>
+          </a:xfrm>
+          <a:prstGeom prst="rect">
+            <a:avLst/>
+          </a:prstGeom>
+        </p:spPr>
+      </p:pic>
+      <p:sp>
+        <p:nvSpPr>
+          <p:cNvPr id="40" name="Rectangle 39">
+            <a:extLst>
+              <a:ext uri="{FF2B5EF4-FFF2-40B4-BE49-F238E27FC236}">
+                <a16:creationId xmlns:a16="http://schemas.microsoft.com/office/drawing/2014/main" id="{3F4C63FE-9526-4F8E-BCFD-954D2EF9475B}"/>
+              </a:ext>
+              <a:ext uri="{C183D7F6-B498-43B3-948B-1728B52AA6E4}">
+                <adec:decorative xmlns:adec="http://schemas.microsoft.com/office/drawing/2017/decorative" val="1"/>
+              </a:ext>
+            </a:extLst>
+          </p:cNvPr>
+          <p:cNvSpPr>
+            <a:spLocks noGrp="1" noRot="1" noChangeAspect="1" noMove="1" noResize="1" noEditPoints="1" noAdjustHandles="1" noChangeArrowheads="1" noChangeShapeType="1" noTextEdit="1"/>
+          </p:cNvSpPr>
+          <p:nvPr>
+            <p:extLst>
+              <p:ext uri="{386F3935-93C4-4BCD-93E2-E3B085C9AB24}">
+                <p16:designElem xmlns:p16="http://schemas.microsoft.com/office/powerpoint/2015/main" val="1"/>
+              </p:ext>
+            </p:extLst>
+          </p:nvPr>
+        </p:nvSpPr>
+        <p:spPr>
+          <a:xfrm>
+            <a:off x="8331468" y="164592"/>
+            <a:ext cx="3708894" cy="6540176"/>
+          </a:xfrm>
+          <a:prstGeom prst="rect">
+            <a:avLst/>
+          </a:prstGeom>
+          <a:noFill/>
+          <a:ln w="6350">
+            <a:solidFill>
+              <a:schemeClr val="tx1">
+                <a:lumMod val="75000"/>
+                <a:lumOff val="25000"/>
+              </a:schemeClr>
+            </a:solidFill>
+          </a:ln>
+        </p:spPr>
+        <p:style>
+          <a:lnRef idx="2">
+            <a:schemeClr val="accent1">
+              <a:shade val="50000"/>
+            </a:schemeClr>
+          </a:lnRef>
+          <a:fillRef idx="1">
+            <a:schemeClr val="accent1"/>
+          </a:fillRef>
+          <a:effectRef idx="0">
+            <a:schemeClr val="accent1"/>
+          </a:effectRef>
+          <a:fontRef idx="minor">
+            <a:schemeClr val="lt1"/>
+          </a:fontRef>
+        </p:style>
+        <p:txBody>
+          <a:bodyPr rtlCol="0" anchor="ctr"/>
+          <a:lstStyle/>
+          <a:p>
+            <a:pPr algn="ctr"/>
+            <a:endParaRPr lang="en-US"/>
+          </a:p>
+        </p:txBody>
+      </p:sp>
+      <p:sp>
+        <p:nvSpPr>
+          <p:cNvPr id="2" name="Title 1">
+            <a:extLst>
+              <a:ext uri="{FF2B5EF4-FFF2-40B4-BE49-F238E27FC236}">
+                <a16:creationId xmlns:a16="http://schemas.microsoft.com/office/drawing/2014/main" id="{92BA71F0-87C5-4431-946A-51318AECDDF6}"/>
+              </a:ext>
+            </a:extLst>
+          </p:cNvPr>
+          <p:cNvSpPr>
+            <a:spLocks noGrp="1"/>
+          </p:cNvSpPr>
+          <p:nvPr>
+            <p:ph type="title"/>
+          </p:nvPr>
+        </p:nvSpPr>
+        <p:spPr>
+          <a:xfrm>
+            <a:off x="8560024" y="1182454"/>
+            <a:ext cx="3238829" cy="3480794"/>
+          </a:xfrm>
+        </p:spPr>
+        <p:txBody>
+          <a:bodyPr vert="horz" lIns="91440" tIns="45720" rIns="91440" bIns="45720" rtlCol="0" anchor="ctr">
+            <a:normAutofit fontScale="90000"/>
+          </a:bodyPr>
+          <a:lstStyle/>
+          <a:p>
+            <a:pPr algn="ctr">
+              <a:lnSpc>
+                <a:spcPct val="83000"/>
+              </a:lnSpc>
+            </a:pPr>
+            <a:r>
+              <a:rPr lang="en-US" sz="4800" cap="all" spc="-100" dirty="0"/>
+              <a:t>How many times do we Write this?</a:t>
+            </a:r>
+          </a:p>
+        </p:txBody>
+      </p:sp>
+    </p:spTree>
+    <p:extLst>
+      <p:ext uri="{BB962C8B-B14F-4D97-AF65-F5344CB8AC3E}">
+        <p14:creationId xmlns:p14="http://schemas.microsoft.com/office/powerpoint/2010/main" val="2132252301"/>
+      </p:ext>
+    </p:extLst>
+  </p:cSld>
+  <p:clrMapOvr>
+    <a:overrideClrMapping bg1="dk1" tx1="lt1" bg2="dk2" tx2="lt2" accent1="accent1" accent2="accent2" accent3="accent3" accent4="accent4" accent5="accent5" accent6="accent6" hlink="hlink" folHlink="folHlink"/>
+  </p:clrMapOvr>
+</p:sld>
+</file>
+
+<file path=ppt/slides/slide4.xml><?xml version="1.0" encoding="utf-8"?>
+<p:sld xmlns:a="http://schemas.openxmlformats.org/drawingml/2006/main" xmlns:r="http://schemas.openxmlformats.org/officeDocument/2006/relationships" xmlns:p="http://schemas.openxmlformats.org/presentationml/2006/main">
+  <p:cSld>
+    <p:bg>
+      <p:bgPr>
+        <a:solidFill>
+          <a:schemeClr val="bg1"/>
+        </a:solidFill>
+        <a:effectLst/>
+      </p:bgPr>
+    </p:bg>
+    <p:spTree>
+      <p:nvGrpSpPr>
+        <p:cNvPr id="1" name=""/>
+        <p:cNvGrpSpPr/>
+        <p:nvPr/>
+      </p:nvGrpSpPr>
+      <p:grpSpPr>
+        <a:xfrm>
+          <a:off x="0" y="0"/>
+          <a:ext cx="0" cy="0"/>
+          <a:chOff x="0" y="0"/>
+          <a:chExt cx="0" cy="0"/>
+        </a:xfrm>
+      </p:grpSpPr>
+      <p:sp>
+        <p:nvSpPr>
           <p:cNvPr id="11" name="Rectangle 10">
             <a:extLst>
               <a:ext uri="{FF2B5EF4-FFF2-40B4-BE49-F238E27FC236}">
@@ -8031,1112 +9139,6 @@
 </p:sld>
 </file>
 
-<file path=ppt/slides/slide4.xml><?xml version="1.0" encoding="utf-8"?>
-<p:sld xmlns:a="http://schemas.openxmlformats.org/drawingml/2006/main" xmlns:r="http://schemas.openxmlformats.org/officeDocument/2006/relationships" xmlns:p="http://schemas.openxmlformats.org/presentationml/2006/main">
-  <p:cSld>
-    <p:bg>
-      <p:bgPr>
-        <a:solidFill>
-          <a:schemeClr val="bg1"/>
-        </a:solidFill>
-        <a:effectLst/>
-      </p:bgPr>
-    </p:bg>
-    <p:spTree>
-      <p:nvGrpSpPr>
-        <p:cNvPr id="1" name=""/>
-        <p:cNvGrpSpPr/>
-        <p:nvPr/>
-      </p:nvGrpSpPr>
-      <p:grpSpPr>
-        <a:xfrm>
-          <a:off x="0" y="0"/>
-          <a:ext cx="0" cy="0"/>
-          <a:chOff x="0" y="0"/>
-          <a:chExt cx="0" cy="0"/>
-        </a:xfrm>
-      </p:grpSpPr>
-      <p:sp>
-        <p:nvSpPr>
-          <p:cNvPr id="9" name="Rectangle 8">
-            <a:extLst>
-              <a:ext uri="{FF2B5EF4-FFF2-40B4-BE49-F238E27FC236}">
-                <a16:creationId xmlns:a16="http://schemas.microsoft.com/office/drawing/2014/main" id="{904DB13E-F722-4ED6-BB00-556651E95281}"/>
-              </a:ext>
-              <a:ext uri="{C183D7F6-B498-43B3-948B-1728B52AA6E4}">
-                <adec:decorative xmlns:adec="http://schemas.microsoft.com/office/drawing/2017/decorative" val="1"/>
-              </a:ext>
-            </a:extLst>
-          </p:cNvPr>
-          <p:cNvSpPr>
-            <a:spLocks noGrp="1" noRot="1" noChangeAspect="1" noMove="1" noResize="1" noEditPoints="1" noAdjustHandles="1" noChangeArrowheads="1" noChangeShapeType="1" noTextEdit="1"/>
-          </p:cNvSpPr>
-          <p:nvPr>
-            <p:extLst>
-              <p:ext uri="{386F3935-93C4-4BCD-93E2-E3B085C9AB24}">
-                <p16:designElem xmlns:p16="http://schemas.microsoft.com/office/powerpoint/2015/main" val="1"/>
-              </p:ext>
-            </p:extLst>
-          </p:nvPr>
-        </p:nvSpPr>
-        <p:spPr>
-          <a:xfrm>
-            <a:off x="0" y="0"/>
-            <a:ext cx="12192000" cy="6858000"/>
-          </a:xfrm>
-          <a:prstGeom prst="rect">
-            <a:avLst/>
-          </a:prstGeom>
-          <a:solidFill>
-            <a:schemeClr val="tx1">
-              <a:lumMod val="65000"/>
-              <a:lumOff val="35000"/>
-            </a:schemeClr>
-          </a:solidFill>
-          <a:ln>
-            <a:noFill/>
-          </a:ln>
-        </p:spPr>
-        <p:style>
-          <a:lnRef idx="2">
-            <a:schemeClr val="accent1">
-              <a:shade val="50000"/>
-            </a:schemeClr>
-          </a:lnRef>
-          <a:fillRef idx="1">
-            <a:schemeClr val="accent1"/>
-          </a:fillRef>
-          <a:effectRef idx="0">
-            <a:schemeClr val="accent1"/>
-          </a:effectRef>
-          <a:fontRef idx="minor">
-            <a:schemeClr val="lt1"/>
-          </a:fontRef>
-        </p:style>
-        <p:txBody>
-          <a:bodyPr rtlCol="0" anchor="ctr"/>
-          <a:lstStyle/>
-          <a:p>
-            <a:pPr algn="ctr"/>
-            <a:endParaRPr lang="en-US"/>
-          </a:p>
-        </p:txBody>
-      </p:sp>
-      <p:sp useBgFill="1">
-        <p:nvSpPr>
-          <p:cNvPr id="11" name="Rectangle 10">
-            <a:extLst>
-              <a:ext uri="{FF2B5EF4-FFF2-40B4-BE49-F238E27FC236}">
-                <a16:creationId xmlns:a16="http://schemas.microsoft.com/office/drawing/2014/main" id="{1E8D93C5-28EB-42D0-86CE-D804955653CC}"/>
-              </a:ext>
-              <a:ext uri="{C183D7F6-B498-43B3-948B-1728B52AA6E4}">
-                <adec:decorative xmlns:adec="http://schemas.microsoft.com/office/drawing/2017/decorative" val="1"/>
-              </a:ext>
-            </a:extLst>
-          </p:cNvPr>
-          <p:cNvSpPr>
-            <a:spLocks noGrp="1" noRot="1" noChangeAspect="1" noMove="1" noResize="1" noEditPoints="1" noAdjustHandles="1" noChangeArrowheads="1" noChangeShapeType="1" noTextEdit="1"/>
-          </p:cNvSpPr>
-          <p:nvPr>
-            <p:extLst>
-              <p:ext uri="{386F3935-93C4-4BCD-93E2-E3B085C9AB24}">
-                <p16:designElem xmlns:p16="http://schemas.microsoft.com/office/powerpoint/2015/main" val="1"/>
-              </p:ext>
-            </p:extLst>
-          </p:nvPr>
-        </p:nvSpPr>
-        <p:spPr>
-          <a:xfrm>
-            <a:off x="1307870" y="1267730"/>
-            <a:ext cx="9576262" cy="4307950"/>
-          </a:xfrm>
-          <a:prstGeom prst="rect">
-            <a:avLst/>
-          </a:prstGeom>
-          <a:ln w="6350" cap="flat" cmpd="sng" algn="ctr">
-            <a:noFill/>
-            <a:prstDash val="solid"/>
-          </a:ln>
-          <a:effectLst>
-            <a:outerShdw blurRad="50800" algn="ctr" rotWithShape="0">
-              <a:prstClr val="black">
-                <a:alpha val="66000"/>
-              </a:prstClr>
-            </a:outerShdw>
-            <a:softEdge rad="0"/>
-          </a:effectLst>
-        </p:spPr>
-      </p:sp>
-      <p:sp>
-        <p:nvSpPr>
-          <p:cNvPr id="13" name="Rectangle 12">
-            <a:extLst>
-              <a:ext uri="{FF2B5EF4-FFF2-40B4-BE49-F238E27FC236}">
-                <a16:creationId xmlns:a16="http://schemas.microsoft.com/office/drawing/2014/main" id="{AB1B1E7D-F76D-4744-AF85-239E6998A4C5}"/>
-              </a:ext>
-              <a:ext uri="{C183D7F6-B498-43B3-948B-1728B52AA6E4}">
-                <adec:decorative xmlns:adec="http://schemas.microsoft.com/office/drawing/2017/decorative" val="1"/>
-              </a:ext>
-            </a:extLst>
-          </p:cNvPr>
-          <p:cNvSpPr>
-            <a:spLocks noGrp="1" noRot="1" noChangeAspect="1" noMove="1" noResize="1" noEditPoints="1" noAdjustHandles="1" noChangeArrowheads="1" noChangeShapeType="1" noTextEdit="1"/>
-          </p:cNvSpPr>
-          <p:nvPr>
-            <p:extLst>
-              <p:ext uri="{386F3935-93C4-4BCD-93E2-E3B085C9AB24}">
-                <p16:designElem xmlns:p16="http://schemas.microsoft.com/office/powerpoint/2015/main" val="1"/>
-              </p:ext>
-            </p:extLst>
-          </p:nvPr>
-        </p:nvSpPr>
-        <p:spPr>
-          <a:xfrm>
-            <a:off x="1447801" y="1411615"/>
-            <a:ext cx="9296400" cy="4034770"/>
-          </a:xfrm>
-          <a:prstGeom prst="rect">
-            <a:avLst/>
-          </a:prstGeom>
-          <a:noFill/>
-          <a:ln w="6350" cap="sq" cmpd="sng" algn="ctr">
-            <a:solidFill>
-              <a:schemeClr val="tx1">
-                <a:lumMod val="75000"/>
-                <a:lumOff val="25000"/>
-              </a:schemeClr>
-            </a:solidFill>
-            <a:prstDash val="solid"/>
-            <a:miter lim="800000"/>
-          </a:ln>
-          <a:effectLst/>
-        </p:spPr>
-      </p:sp>
-      <p:sp>
-        <p:nvSpPr>
-          <p:cNvPr id="15" name="Rectangle 14">
-            <a:extLst>
-              <a:ext uri="{FF2B5EF4-FFF2-40B4-BE49-F238E27FC236}">
-                <a16:creationId xmlns:a16="http://schemas.microsoft.com/office/drawing/2014/main" id="{3BB65211-00DB-45B6-A223-033B2D19CBE8}"/>
-              </a:ext>
-              <a:ext uri="{C183D7F6-B498-43B3-948B-1728B52AA6E4}">
-                <adec:decorative xmlns:adec="http://schemas.microsoft.com/office/drawing/2017/decorative" val="1"/>
-              </a:ext>
-            </a:extLst>
-          </p:cNvPr>
-          <p:cNvSpPr>
-            <a:spLocks noGrp="1" noRot="1" noChangeAspect="1" noMove="1" noResize="1" noEditPoints="1" noAdjustHandles="1" noChangeArrowheads="1" noChangeShapeType="1" noTextEdit="1"/>
-          </p:cNvSpPr>
-          <p:nvPr>
-            <p:extLst>
-              <p:ext uri="{386F3935-93C4-4BCD-93E2-E3B085C9AB24}">
-                <p16:designElem xmlns:p16="http://schemas.microsoft.com/office/powerpoint/2015/main" val="1"/>
-              </p:ext>
-            </p:extLst>
-          </p:nvPr>
-        </p:nvSpPr>
-        <p:spPr>
-          <a:xfrm>
-            <a:off x="5135880" y="1267730"/>
-            <a:ext cx="1920240" cy="731520"/>
-          </a:xfrm>
-          <a:prstGeom prst="rect">
-            <a:avLst/>
-          </a:prstGeom>
-          <a:solidFill>
-            <a:schemeClr val="accent1"/>
-          </a:solidFill>
-          <a:ln>
-            <a:noFill/>
-          </a:ln>
-        </p:spPr>
-        <p:style>
-          <a:lnRef idx="2">
-            <a:schemeClr val="accent1">
-              <a:shade val="50000"/>
-            </a:schemeClr>
-          </a:lnRef>
-          <a:fillRef idx="1">
-            <a:schemeClr val="accent1"/>
-          </a:fillRef>
-          <a:effectRef idx="0">
-            <a:schemeClr val="accent1"/>
-          </a:effectRef>
-          <a:fontRef idx="minor">
-            <a:schemeClr val="lt1"/>
-          </a:fontRef>
-        </p:style>
-      </p:sp>
-      <p:grpSp>
-        <p:nvGrpSpPr>
-          <p:cNvPr id="17" name="Group 16">
-            <a:extLst>
-              <a:ext uri="{FF2B5EF4-FFF2-40B4-BE49-F238E27FC236}">
-                <a16:creationId xmlns:a16="http://schemas.microsoft.com/office/drawing/2014/main" id="{E26428D7-C6F3-473D-A360-A3F5C3E8728C}"/>
-              </a:ext>
-              <a:ext uri="{C183D7F6-B498-43B3-948B-1728B52AA6E4}">
-                <adec:decorative xmlns:adec="http://schemas.microsoft.com/office/drawing/2017/decorative" val="1"/>
-              </a:ext>
-            </a:extLst>
-          </p:cNvPr>
-          <p:cNvGrpSpPr>
-            <a:grpSpLocks noGrp="1" noUngrp="1" noRot="1" noChangeAspect="1" noMove="1" noResize="1"/>
-          </p:cNvGrpSpPr>
-          <p:nvPr>
-            <p:extLst>
-              <p:ext uri="{386F3935-93C4-4BCD-93E2-E3B085C9AB24}">
-                <p16:designElem xmlns:p16="http://schemas.microsoft.com/office/powerpoint/2015/main" val="1"/>
-              </p:ext>
-            </p:extLst>
-          </p:nvPr>
-        </p:nvGrpSpPr>
-        <p:grpSpPr>
-          <a:xfrm>
-            <a:off x="5250180" y="1267730"/>
-            <a:ext cx="1691640" cy="615934"/>
-            <a:chOff x="5250180" y="1267730"/>
-            <a:chExt cx="1691640" cy="615934"/>
-          </a:xfrm>
-        </p:grpSpPr>
-        <p:cxnSp>
-          <p:nvCxnSpPr>
-            <p:cNvPr id="18" name="Straight Connector 17">
-              <a:extLst>
-                <a:ext uri="{FF2B5EF4-FFF2-40B4-BE49-F238E27FC236}">
-                  <a16:creationId xmlns:a16="http://schemas.microsoft.com/office/drawing/2014/main" id="{14DF524F-3FEF-4236-90C6-820E876A94EE}"/>
-                </a:ext>
-                <a:ext uri="{C183D7F6-B498-43B3-948B-1728B52AA6E4}">
-                  <adec:decorative xmlns:adec="http://schemas.microsoft.com/office/drawing/2017/decorative" val="1"/>
-                </a:ext>
-              </a:extLst>
-            </p:cNvPr>
-            <p:cNvCxnSpPr/>
-            <p:nvPr>
-              <p:extLst>
-                <p:ext uri="{386F3935-93C4-4BCD-93E2-E3B085C9AB24}">
-                  <p16:designElem xmlns:p16="http://schemas.microsoft.com/office/powerpoint/2015/main" val="1"/>
-                </p:ext>
-              </p:extLst>
-            </p:nvPr>
-          </p:nvCxnSpPr>
-          <p:spPr>
-            <a:xfrm>
-              <a:off x="5250180" y="1267730"/>
-              <a:ext cx="0" cy="612648"/>
-            </a:xfrm>
-            <a:prstGeom prst="line">
-              <a:avLst/>
-            </a:prstGeom>
-            <a:solidFill>
-              <a:schemeClr val="tx1">
-                <a:lumMod val="85000"/>
-                <a:lumOff val="15000"/>
-              </a:schemeClr>
-            </a:solidFill>
-            <a:ln>
-              <a:solidFill>
-                <a:srgbClr val="FFFFFF"/>
-              </a:solidFill>
-              <a:miter lim="800000"/>
-            </a:ln>
-          </p:spPr>
-          <p:style>
-            <a:lnRef idx="1">
-              <a:schemeClr val="accent1"/>
-            </a:lnRef>
-            <a:fillRef idx="0">
-              <a:schemeClr val="accent1"/>
-            </a:fillRef>
-            <a:effectRef idx="0">
-              <a:schemeClr val="accent1"/>
-            </a:effectRef>
-            <a:fontRef idx="minor">
-              <a:schemeClr val="tx1"/>
-            </a:fontRef>
-          </p:style>
-        </p:cxnSp>
-        <p:cxnSp>
-          <p:nvCxnSpPr>
-            <p:cNvPr id="19" name="Straight Connector 18">
-              <a:extLst>
-                <a:ext uri="{FF2B5EF4-FFF2-40B4-BE49-F238E27FC236}">
-                  <a16:creationId xmlns:a16="http://schemas.microsoft.com/office/drawing/2014/main" id="{2400A003-1BE9-49C2-8E57-DCD9B870FC8A}"/>
-                </a:ext>
-                <a:ext uri="{C183D7F6-B498-43B3-948B-1728B52AA6E4}">
-                  <adec:decorative xmlns:adec="http://schemas.microsoft.com/office/drawing/2017/decorative" val="1"/>
-                </a:ext>
-              </a:extLst>
-            </p:cNvPr>
-            <p:cNvCxnSpPr/>
-            <p:nvPr>
-              <p:extLst>
-                <p:ext uri="{386F3935-93C4-4BCD-93E2-E3B085C9AB24}">
-                  <p16:designElem xmlns:p16="http://schemas.microsoft.com/office/powerpoint/2015/main" val="1"/>
-                </p:ext>
-              </p:extLst>
-            </p:nvPr>
-          </p:nvCxnSpPr>
-          <p:spPr>
-            <a:xfrm>
-              <a:off x="6941820" y="1267730"/>
-              <a:ext cx="0" cy="612648"/>
-            </a:xfrm>
-            <a:prstGeom prst="line">
-              <a:avLst/>
-            </a:prstGeom>
-            <a:solidFill>
-              <a:schemeClr val="tx1">
-                <a:lumMod val="85000"/>
-                <a:lumOff val="15000"/>
-              </a:schemeClr>
-            </a:solidFill>
-            <a:ln>
-              <a:solidFill>
-                <a:srgbClr val="FFFFFF"/>
-              </a:solidFill>
-              <a:miter lim="800000"/>
-            </a:ln>
-          </p:spPr>
-          <p:style>
-            <a:lnRef idx="1">
-              <a:schemeClr val="accent1"/>
-            </a:lnRef>
-            <a:fillRef idx="0">
-              <a:schemeClr val="accent1"/>
-            </a:fillRef>
-            <a:effectRef idx="0">
-              <a:schemeClr val="accent1"/>
-            </a:effectRef>
-            <a:fontRef idx="minor">
-              <a:schemeClr val="tx1"/>
-            </a:fontRef>
-          </p:style>
-        </p:cxnSp>
-        <p:cxnSp>
-          <p:nvCxnSpPr>
-            <p:cNvPr id="20" name="Straight Connector 19">
-              <a:extLst>
-                <a:ext uri="{FF2B5EF4-FFF2-40B4-BE49-F238E27FC236}">
-                  <a16:creationId xmlns:a16="http://schemas.microsoft.com/office/drawing/2014/main" id="{83BF0991-F9A1-4282-99DB-92D70239F6A9}"/>
-                </a:ext>
-                <a:ext uri="{C183D7F6-B498-43B3-948B-1728B52AA6E4}">
-                  <adec:decorative xmlns:adec="http://schemas.microsoft.com/office/drawing/2017/decorative" val="1"/>
-                </a:ext>
-              </a:extLst>
-            </p:cNvPr>
-            <p:cNvCxnSpPr/>
-            <p:nvPr>
-              <p:extLst>
-                <p:ext uri="{386F3935-93C4-4BCD-93E2-E3B085C9AB24}">
-                  <p16:designElem xmlns:p16="http://schemas.microsoft.com/office/powerpoint/2015/main" val="1"/>
-                </p:ext>
-              </p:extLst>
-            </p:nvPr>
-          </p:nvCxnSpPr>
-          <p:spPr>
-            <a:xfrm>
-              <a:off x="5250180" y="1883664"/>
-              <a:ext cx="1691640" cy="0"/>
-            </a:xfrm>
-            <a:prstGeom prst="line">
-              <a:avLst/>
-            </a:prstGeom>
-            <a:solidFill>
-              <a:schemeClr val="tx1">
-                <a:lumMod val="85000"/>
-                <a:lumOff val="15000"/>
-              </a:schemeClr>
-            </a:solidFill>
-            <a:ln>
-              <a:solidFill>
-                <a:srgbClr val="FFFFFF"/>
-              </a:solidFill>
-              <a:miter lim="800000"/>
-            </a:ln>
-          </p:spPr>
-          <p:style>
-            <a:lnRef idx="1">
-              <a:schemeClr val="accent1"/>
-            </a:lnRef>
-            <a:fillRef idx="0">
-              <a:schemeClr val="accent1"/>
-            </a:fillRef>
-            <a:effectRef idx="0">
-              <a:schemeClr val="accent1"/>
-            </a:effectRef>
-            <a:fontRef idx="minor">
-              <a:schemeClr val="tx1"/>
-            </a:fontRef>
-          </p:style>
-        </p:cxnSp>
-      </p:grpSp>
-      <p:sp>
-        <p:nvSpPr>
-          <p:cNvPr id="22" name="Rectangle 21">
-            <a:extLst>
-              <a:ext uri="{FF2B5EF4-FFF2-40B4-BE49-F238E27FC236}">
-                <a16:creationId xmlns:a16="http://schemas.microsoft.com/office/drawing/2014/main" id="{9891C27D-8C9D-415C-A639-23D76B7B1C1D}"/>
-              </a:ext>
-              <a:ext uri="{C183D7F6-B498-43B3-948B-1728B52AA6E4}">
-                <adec:decorative xmlns:adec="http://schemas.microsoft.com/office/drawing/2017/decorative" val="1"/>
-              </a:ext>
-            </a:extLst>
-          </p:cNvPr>
-          <p:cNvSpPr>
-            <a:spLocks noGrp="1" noRot="1" noChangeAspect="1" noMove="1" noResize="1" noEditPoints="1" noAdjustHandles="1" noChangeArrowheads="1" noChangeShapeType="1" noTextEdit="1"/>
-          </p:cNvSpPr>
-          <p:nvPr>
-            <p:extLst>
-              <p:ext uri="{386F3935-93C4-4BCD-93E2-E3B085C9AB24}">
-                <p16:designElem xmlns:p16="http://schemas.microsoft.com/office/powerpoint/2015/main" val="1"/>
-              </p:ext>
-            </p:extLst>
-          </p:nvPr>
-        </p:nvSpPr>
-        <p:spPr>
-          <a:xfrm>
-            <a:off x="0" y="0"/>
-            <a:ext cx="12192000" cy="6858000"/>
-          </a:xfrm>
-          <a:prstGeom prst="rect">
-            <a:avLst/>
-          </a:prstGeom>
-          <a:solidFill>
-            <a:schemeClr val="bg1"/>
-          </a:solidFill>
-          <a:ln>
-            <a:noFill/>
-          </a:ln>
-        </p:spPr>
-        <p:style>
-          <a:lnRef idx="2">
-            <a:schemeClr val="accent1">
-              <a:shade val="50000"/>
-            </a:schemeClr>
-          </a:lnRef>
-          <a:fillRef idx="1">
-            <a:schemeClr val="accent1"/>
-          </a:fillRef>
-          <a:effectRef idx="0">
-            <a:schemeClr val="accent1"/>
-          </a:effectRef>
-          <a:fontRef idx="minor">
-            <a:schemeClr val="lt1"/>
-          </a:fontRef>
-        </p:style>
-        <p:txBody>
-          <a:bodyPr rtlCol="0" anchor="ctr"/>
-          <a:lstStyle/>
-          <a:p>
-            <a:pPr algn="ctr"/>
-            <a:endParaRPr lang="en-US"/>
-          </a:p>
-        </p:txBody>
-      </p:sp>
-      <p:sp>
-        <p:nvSpPr>
-          <p:cNvPr id="24" name="Rectangle 23">
-            <a:extLst>
-              <a:ext uri="{FF2B5EF4-FFF2-40B4-BE49-F238E27FC236}">
-                <a16:creationId xmlns:a16="http://schemas.microsoft.com/office/drawing/2014/main" id="{E8F4C0D6-B7E0-42D0-A57F-6781017A2164}"/>
-              </a:ext>
-              <a:ext uri="{C183D7F6-B498-43B3-948B-1728B52AA6E4}">
-                <adec:decorative xmlns:adec="http://schemas.microsoft.com/office/drawing/2017/decorative" val="1"/>
-              </a:ext>
-            </a:extLst>
-          </p:cNvPr>
-          <p:cNvSpPr>
-            <a:spLocks noGrp="1" noRot="1" noChangeAspect="1" noMove="1" noResize="1" noEditPoints="1" noAdjustHandles="1" noChangeArrowheads="1" noChangeShapeType="1" noTextEdit="1"/>
-          </p:cNvSpPr>
-          <p:nvPr>
-            <p:extLst>
-              <p:ext uri="{386F3935-93C4-4BCD-93E2-E3B085C9AB24}">
-                <p16:designElem xmlns:p16="http://schemas.microsoft.com/office/powerpoint/2015/main" val="1"/>
-              </p:ext>
-            </p:extLst>
-          </p:nvPr>
-        </p:nvSpPr>
-        <p:spPr>
-          <a:xfrm>
-            <a:off x="0" y="0"/>
-            <a:ext cx="12192000" cy="6858000"/>
-          </a:xfrm>
-          <a:prstGeom prst="rect">
-            <a:avLst/>
-          </a:prstGeom>
-          <a:solidFill>
-            <a:schemeClr val="bg1">
-              <a:lumMod val="75000"/>
-              <a:lumOff val="25000"/>
-            </a:schemeClr>
-          </a:solidFill>
-          <a:ln>
-            <a:noFill/>
-          </a:ln>
-        </p:spPr>
-        <p:style>
-          <a:lnRef idx="2">
-            <a:schemeClr val="accent1">
-              <a:shade val="50000"/>
-            </a:schemeClr>
-          </a:lnRef>
-          <a:fillRef idx="1002">
-            <a:schemeClr val="lt2"/>
-          </a:fillRef>
-          <a:effectRef idx="0">
-            <a:schemeClr val="accent1"/>
-          </a:effectRef>
-          <a:fontRef idx="minor">
-            <a:schemeClr val="lt1"/>
-          </a:fontRef>
-        </p:style>
-        <p:txBody>
-          <a:bodyPr rtlCol="0" anchor="ctr"/>
-          <a:lstStyle/>
-          <a:p>
-            <a:pPr algn="ctr"/>
-            <a:endParaRPr lang="en-US" dirty="0"/>
-          </a:p>
-        </p:txBody>
-      </p:sp>
-      <p:sp>
-        <p:nvSpPr>
-          <p:cNvPr id="26" name="Rectangle 25">
-            <a:extLst>
-              <a:ext uri="{FF2B5EF4-FFF2-40B4-BE49-F238E27FC236}">
-                <a16:creationId xmlns:a16="http://schemas.microsoft.com/office/drawing/2014/main" id="{5B4D6D08-A7F1-4445-BA2E-E449562C04C1}"/>
-              </a:ext>
-              <a:ext uri="{C183D7F6-B498-43B3-948B-1728B52AA6E4}">
-                <adec:decorative xmlns:adec="http://schemas.microsoft.com/office/drawing/2017/decorative" val="1"/>
-              </a:ext>
-            </a:extLst>
-          </p:cNvPr>
-          <p:cNvSpPr>
-            <a:spLocks noGrp="1" noRot="1" noChangeAspect="1" noMove="1" noResize="1" noEditPoints="1" noAdjustHandles="1" noChangeArrowheads="1" noChangeShapeType="1" noTextEdit="1"/>
-          </p:cNvSpPr>
-          <p:nvPr>
-            <p:extLst>
-              <p:ext uri="{386F3935-93C4-4BCD-93E2-E3B085C9AB24}">
-                <p16:designElem xmlns:p16="http://schemas.microsoft.com/office/powerpoint/2015/main" val="1"/>
-              </p:ext>
-            </p:extLst>
-          </p:nvPr>
-        </p:nvSpPr>
-        <p:spPr>
-          <a:xfrm>
-            <a:off x="-1867" y="0"/>
-            <a:ext cx="8168743" cy="6858000"/>
-          </a:xfrm>
-          <a:prstGeom prst="rect">
-            <a:avLst/>
-          </a:prstGeom>
-          <a:solidFill>
-            <a:schemeClr val="tx1">
-              <a:lumMod val="85000"/>
-            </a:schemeClr>
-          </a:solidFill>
-          <a:ln>
-            <a:noFill/>
-          </a:ln>
-        </p:spPr>
-        <p:style>
-          <a:lnRef idx="2">
-            <a:schemeClr val="accent1">
-              <a:shade val="50000"/>
-            </a:schemeClr>
-          </a:lnRef>
-          <a:fillRef idx="1">
-            <a:schemeClr val="accent1"/>
-          </a:fillRef>
-          <a:effectRef idx="0">
-            <a:schemeClr val="accent1"/>
-          </a:effectRef>
-          <a:fontRef idx="minor">
-            <a:schemeClr val="lt1"/>
-          </a:fontRef>
-        </p:style>
-        <p:txBody>
-          <a:bodyPr rtlCol="0" anchor="ctr"/>
-          <a:lstStyle/>
-          <a:p>
-            <a:pPr algn="ctr"/>
-            <a:endParaRPr lang="en-US"/>
-          </a:p>
-        </p:txBody>
-      </p:sp>
-      <p:sp>
-        <p:nvSpPr>
-          <p:cNvPr id="28" name="Rectangle 27">
-            <a:extLst>
-              <a:ext uri="{FF2B5EF4-FFF2-40B4-BE49-F238E27FC236}">
-                <a16:creationId xmlns:a16="http://schemas.microsoft.com/office/drawing/2014/main" id="{3A7C1A41-D915-4D26-8D5E-C01B27160A80}"/>
-              </a:ext>
-              <a:ext uri="{C183D7F6-B498-43B3-948B-1728B52AA6E4}">
-                <adec:decorative xmlns:adec="http://schemas.microsoft.com/office/drawing/2017/decorative" val="1"/>
-              </a:ext>
-            </a:extLst>
-          </p:cNvPr>
-          <p:cNvSpPr>
-            <a:spLocks noGrp="1" noRot="1" noChangeAspect="1" noMove="1" noResize="1" noEditPoints="1" noAdjustHandles="1" noChangeArrowheads="1" noChangeShapeType="1" noTextEdit="1"/>
-          </p:cNvSpPr>
-          <p:nvPr>
-            <p:extLst>
-              <p:ext uri="{386F3935-93C4-4BCD-93E2-E3B085C9AB24}">
-                <p16:designElem xmlns:p16="http://schemas.microsoft.com/office/powerpoint/2015/main" val="1"/>
-              </p:ext>
-            </p:extLst>
-          </p:nvPr>
-        </p:nvSpPr>
-        <p:spPr>
-          <a:xfrm>
-            <a:off x="643337" y="643464"/>
-            <a:ext cx="6909241" cy="5571072"/>
-          </a:xfrm>
-          <a:prstGeom prst="rect">
-            <a:avLst/>
-          </a:prstGeom>
-          <a:solidFill>
-            <a:srgbClr val="FFFFFF"/>
-          </a:solidFill>
-          <a:ln w="6350" cap="flat" cmpd="sng" algn="ctr">
-            <a:noFill/>
-            <a:prstDash val="solid"/>
-          </a:ln>
-          <a:effectLst>
-            <a:outerShdw blurRad="50800" algn="ctr" rotWithShape="0">
-              <a:prstClr val="black">
-                <a:alpha val="66000"/>
-              </a:prstClr>
-            </a:outerShdw>
-            <a:softEdge rad="0"/>
-          </a:effectLst>
-        </p:spPr>
-      </p:sp>
-      <p:sp>
-        <p:nvSpPr>
-          <p:cNvPr id="30" name="Rectangle 29">
-            <a:extLst>
-              <a:ext uri="{FF2B5EF4-FFF2-40B4-BE49-F238E27FC236}">
-                <a16:creationId xmlns:a16="http://schemas.microsoft.com/office/drawing/2014/main" id="{A50B663E-F671-4504-99A8-4559554692B0}"/>
-              </a:ext>
-              <a:ext uri="{C183D7F6-B498-43B3-948B-1728B52AA6E4}">
-                <adec:decorative xmlns:adec="http://schemas.microsoft.com/office/drawing/2017/decorative" val="1"/>
-              </a:ext>
-            </a:extLst>
-          </p:cNvPr>
-          <p:cNvSpPr>
-            <a:spLocks noGrp="1" noRot="1" noChangeAspect="1" noMove="1" noResize="1" noEditPoints="1" noAdjustHandles="1" noChangeArrowheads="1" noChangeShapeType="1" noTextEdit="1"/>
-          </p:cNvSpPr>
-          <p:nvPr>
-            <p:extLst>
-              <p:ext uri="{386F3935-93C4-4BCD-93E2-E3B085C9AB24}">
-                <p16:designElem xmlns:p16="http://schemas.microsoft.com/office/powerpoint/2015/main" val="1"/>
-              </p:ext>
-            </p:extLst>
-          </p:nvPr>
-        </p:nvSpPr>
-        <p:spPr>
-          <a:xfrm>
-            <a:off x="811227" y="805446"/>
-            <a:ext cx="6570161" cy="5244497"/>
-          </a:xfrm>
-          <a:prstGeom prst="rect">
-            <a:avLst/>
-          </a:prstGeom>
-          <a:noFill/>
-          <a:ln w="6350" cap="sq" cmpd="sng" algn="ctr">
-            <a:solidFill>
-              <a:srgbClr val="404040"/>
-            </a:solidFill>
-            <a:prstDash val="solid"/>
-            <a:miter lim="800000"/>
-          </a:ln>
-          <a:effectLst/>
-        </p:spPr>
-      </p:sp>
-      <p:sp>
-        <p:nvSpPr>
-          <p:cNvPr id="32" name="Rectangle 31">
-            <a:extLst>
-              <a:ext uri="{FF2B5EF4-FFF2-40B4-BE49-F238E27FC236}">
-                <a16:creationId xmlns:a16="http://schemas.microsoft.com/office/drawing/2014/main" id="{2EF89585-ECD6-4B38-96B1-AD41A1BD4BE1}"/>
-              </a:ext>
-              <a:ext uri="{C183D7F6-B498-43B3-948B-1728B52AA6E4}">
-                <adec:decorative xmlns:adec="http://schemas.microsoft.com/office/drawing/2017/decorative" val="1"/>
-              </a:ext>
-            </a:extLst>
-          </p:cNvPr>
-          <p:cNvSpPr>
-            <a:spLocks noGrp="1" noRot="1" noChangeAspect="1" noMove="1" noResize="1" noEditPoints="1" noAdjustHandles="1" noChangeArrowheads="1" noChangeShapeType="1" noTextEdit="1"/>
-          </p:cNvSpPr>
-          <p:nvPr>
-            <p:extLst>
-              <p:ext uri="{386F3935-93C4-4BCD-93E2-E3B085C9AB24}">
-                <p16:designElem xmlns:p16="http://schemas.microsoft.com/office/powerpoint/2015/main" val="1"/>
-              </p:ext>
-            </p:extLst>
-          </p:nvPr>
-        </p:nvSpPr>
-        <p:spPr>
-          <a:xfrm>
-            <a:off x="3137837" y="640856"/>
-            <a:ext cx="1920240" cy="731520"/>
-          </a:xfrm>
-          <a:prstGeom prst="rect">
-            <a:avLst/>
-          </a:prstGeom>
-          <a:solidFill>
-            <a:schemeClr val="accent1"/>
-          </a:solidFill>
-          <a:ln>
-            <a:noFill/>
-          </a:ln>
-        </p:spPr>
-        <p:style>
-          <a:lnRef idx="2">
-            <a:schemeClr val="accent1">
-              <a:shade val="50000"/>
-            </a:schemeClr>
-          </a:lnRef>
-          <a:fillRef idx="1">
-            <a:schemeClr val="accent1"/>
-          </a:fillRef>
-          <a:effectRef idx="0">
-            <a:schemeClr val="accent1"/>
-          </a:effectRef>
-          <a:fontRef idx="minor">
-            <a:schemeClr val="lt1"/>
-          </a:fontRef>
-        </p:style>
-      </p:sp>
-      <p:cxnSp>
-        <p:nvCxnSpPr>
-          <p:cNvPr id="34" name="Straight Connector 33">
-            <a:extLst>
-              <a:ext uri="{FF2B5EF4-FFF2-40B4-BE49-F238E27FC236}">
-                <a16:creationId xmlns:a16="http://schemas.microsoft.com/office/drawing/2014/main" id="{1B6FCD50-3FE8-4AB2-B746-2CC0EA9D4074}"/>
-              </a:ext>
-              <a:ext uri="{C183D7F6-B498-43B3-948B-1728B52AA6E4}">
-                <adec:decorative xmlns:adec="http://schemas.microsoft.com/office/drawing/2017/decorative" val="1"/>
-              </a:ext>
-            </a:extLst>
-          </p:cNvPr>
-          <p:cNvCxnSpPr>
-            <a:cxnSpLocks noGrp="1" noRot="1" noChangeAspect="1" noMove="1" noResize="1" noEditPoints="1" noAdjustHandles="1" noChangeArrowheads="1" noChangeShapeType="1"/>
-          </p:cNvCxnSpPr>
-          <p:nvPr>
-            <p:extLst>
-              <p:ext uri="{386F3935-93C4-4BCD-93E2-E3B085C9AB24}">
-                <p16:designElem xmlns:p16="http://schemas.microsoft.com/office/powerpoint/2015/main" val="1"/>
-              </p:ext>
-            </p:extLst>
-          </p:nvPr>
-        </p:nvCxnSpPr>
-        <p:spPr>
-          <a:xfrm>
-            <a:off x="3252137" y="640855"/>
-            <a:ext cx="0" cy="640080"/>
-          </a:xfrm>
-          <a:prstGeom prst="line">
-            <a:avLst/>
-          </a:prstGeom>
-          <a:solidFill>
-            <a:schemeClr val="tx1">
-              <a:lumMod val="85000"/>
-              <a:lumOff val="15000"/>
-            </a:schemeClr>
-          </a:solidFill>
-          <a:ln>
-            <a:solidFill>
-              <a:srgbClr val="FFFFFF"/>
-            </a:solidFill>
-            <a:miter lim="800000"/>
-          </a:ln>
-        </p:spPr>
-        <p:style>
-          <a:lnRef idx="1">
-            <a:schemeClr val="accent1"/>
-          </a:lnRef>
-          <a:fillRef idx="0">
-            <a:schemeClr val="accent1"/>
-          </a:fillRef>
-          <a:effectRef idx="0">
-            <a:schemeClr val="accent1"/>
-          </a:effectRef>
-          <a:fontRef idx="minor">
-            <a:schemeClr val="tx1"/>
-          </a:fontRef>
-        </p:style>
-      </p:cxnSp>
-      <p:cxnSp>
-        <p:nvCxnSpPr>
-          <p:cNvPr id="36" name="Straight Connector 35">
-            <a:extLst>
-              <a:ext uri="{FF2B5EF4-FFF2-40B4-BE49-F238E27FC236}">
-                <a16:creationId xmlns:a16="http://schemas.microsoft.com/office/drawing/2014/main" id="{B3E90108-E441-4AF0-A059-613D076C7CDA}"/>
-              </a:ext>
-              <a:ext uri="{C183D7F6-B498-43B3-948B-1728B52AA6E4}">
-                <adec:decorative xmlns:adec="http://schemas.microsoft.com/office/drawing/2017/decorative" val="1"/>
-              </a:ext>
-            </a:extLst>
-          </p:cNvPr>
-          <p:cNvCxnSpPr>
-            <a:cxnSpLocks noGrp="1" noRot="1" noChangeAspect="1" noMove="1" noResize="1" noEditPoints="1" noAdjustHandles="1" noChangeArrowheads="1" noChangeShapeType="1"/>
-          </p:cNvCxnSpPr>
-          <p:nvPr>
-            <p:extLst>
-              <p:ext uri="{386F3935-93C4-4BCD-93E2-E3B085C9AB24}">
-                <p16:designElem xmlns:p16="http://schemas.microsoft.com/office/powerpoint/2015/main" val="1"/>
-              </p:ext>
-            </p:extLst>
-          </p:nvPr>
-        </p:nvCxnSpPr>
-        <p:spPr>
-          <a:xfrm>
-            <a:off x="4943777" y="640855"/>
-            <a:ext cx="0" cy="640080"/>
-          </a:xfrm>
-          <a:prstGeom prst="line">
-            <a:avLst/>
-          </a:prstGeom>
-          <a:solidFill>
-            <a:schemeClr val="tx1">
-              <a:lumMod val="85000"/>
-              <a:lumOff val="15000"/>
-            </a:schemeClr>
-          </a:solidFill>
-          <a:ln>
-            <a:solidFill>
-              <a:srgbClr val="FFFFFF"/>
-            </a:solidFill>
-            <a:miter lim="800000"/>
-          </a:ln>
-        </p:spPr>
-        <p:style>
-          <a:lnRef idx="1">
-            <a:schemeClr val="accent1"/>
-          </a:lnRef>
-          <a:fillRef idx="0">
-            <a:schemeClr val="accent1"/>
-          </a:fillRef>
-          <a:effectRef idx="0">
-            <a:schemeClr val="accent1"/>
-          </a:effectRef>
-          <a:fontRef idx="minor">
-            <a:schemeClr val="tx1"/>
-          </a:fontRef>
-        </p:style>
-      </p:cxnSp>
-      <p:cxnSp>
-        <p:nvCxnSpPr>
-          <p:cNvPr id="38" name="Straight Connector 37">
-            <a:extLst>
-              <a:ext uri="{FF2B5EF4-FFF2-40B4-BE49-F238E27FC236}">
-                <a16:creationId xmlns:a16="http://schemas.microsoft.com/office/drawing/2014/main" id="{0B422045-789A-442D-9E39-6FC4EC452C4C}"/>
-              </a:ext>
-              <a:ext uri="{C183D7F6-B498-43B3-948B-1728B52AA6E4}">
-                <adec:decorative xmlns:adec="http://schemas.microsoft.com/office/drawing/2017/decorative" val="1"/>
-              </a:ext>
-            </a:extLst>
-          </p:cNvPr>
-          <p:cNvCxnSpPr>
-            <a:cxnSpLocks noGrp="1" noRot="1" noChangeAspect="1" noMove="1" noResize="1" noEditPoints="1" noAdjustHandles="1" noChangeArrowheads="1" noChangeShapeType="1"/>
-          </p:cNvCxnSpPr>
-          <p:nvPr>
-            <p:extLst>
-              <p:ext uri="{386F3935-93C4-4BCD-93E2-E3B085C9AB24}">
-                <p16:designElem xmlns:p16="http://schemas.microsoft.com/office/powerpoint/2015/main" val="1"/>
-              </p:ext>
-            </p:extLst>
-          </p:nvPr>
-        </p:nvCxnSpPr>
-        <p:spPr>
-          <a:xfrm>
-            <a:off x="3252137" y="1286150"/>
-            <a:ext cx="1691640" cy="0"/>
-          </a:xfrm>
-          <a:prstGeom prst="line">
-            <a:avLst/>
-          </a:prstGeom>
-          <a:solidFill>
-            <a:schemeClr val="tx1">
-              <a:lumMod val="85000"/>
-              <a:lumOff val="15000"/>
-            </a:schemeClr>
-          </a:solidFill>
-          <a:ln>
-            <a:solidFill>
-              <a:srgbClr val="FFFFFF"/>
-            </a:solidFill>
-            <a:miter lim="800000"/>
-          </a:ln>
-        </p:spPr>
-        <p:style>
-          <a:lnRef idx="1">
-            <a:schemeClr val="accent1"/>
-          </a:lnRef>
-          <a:fillRef idx="0">
-            <a:schemeClr val="accent1"/>
-          </a:fillRef>
-          <a:effectRef idx="0">
-            <a:schemeClr val="accent1"/>
-          </a:effectRef>
-          <a:fontRef idx="minor">
-            <a:schemeClr val="tx1"/>
-          </a:fontRef>
-        </p:style>
-      </p:cxnSp>
-      <p:pic>
-        <p:nvPicPr>
-          <p:cNvPr id="4" name="Content Placeholder 3">
-            <a:extLst>
-              <a:ext uri="{FF2B5EF4-FFF2-40B4-BE49-F238E27FC236}">
-                <a16:creationId xmlns:a16="http://schemas.microsoft.com/office/drawing/2014/main" id="{8ACF3DD3-8F0C-2A42-AF2E-75D3948E00F0}"/>
-              </a:ext>
-            </a:extLst>
-          </p:cNvPr>
-          <p:cNvPicPr>
-            <a:picLocks noGrp="1" noChangeAspect="1"/>
-          </p:cNvPicPr>
-          <p:nvPr>
-            <p:ph idx="1"/>
-          </p:nvPr>
-        </p:nvPicPr>
-        <p:blipFill>
-          <a:blip r:embed="rId2"/>
-          <a:stretch>
-            <a:fillRect/>
-          </a:stretch>
-        </p:blipFill>
-        <p:spPr>
-          <a:xfrm>
-            <a:off x="1295859" y="1971370"/>
-            <a:ext cx="5600897" cy="3318530"/>
-          </a:xfrm>
-          <a:prstGeom prst="rect">
-            <a:avLst/>
-          </a:prstGeom>
-        </p:spPr>
-      </p:pic>
-      <p:sp>
-        <p:nvSpPr>
-          <p:cNvPr id="40" name="Rectangle 39">
-            <a:extLst>
-              <a:ext uri="{FF2B5EF4-FFF2-40B4-BE49-F238E27FC236}">
-                <a16:creationId xmlns:a16="http://schemas.microsoft.com/office/drawing/2014/main" id="{3F4C63FE-9526-4F8E-BCFD-954D2EF9475B}"/>
-              </a:ext>
-              <a:ext uri="{C183D7F6-B498-43B3-948B-1728B52AA6E4}">
-                <adec:decorative xmlns:adec="http://schemas.microsoft.com/office/drawing/2017/decorative" val="1"/>
-              </a:ext>
-            </a:extLst>
-          </p:cNvPr>
-          <p:cNvSpPr>
-            <a:spLocks noGrp="1" noRot="1" noChangeAspect="1" noMove="1" noResize="1" noEditPoints="1" noAdjustHandles="1" noChangeArrowheads="1" noChangeShapeType="1" noTextEdit="1"/>
-          </p:cNvSpPr>
-          <p:nvPr>
-            <p:extLst>
-              <p:ext uri="{386F3935-93C4-4BCD-93E2-E3B085C9AB24}">
-                <p16:designElem xmlns:p16="http://schemas.microsoft.com/office/powerpoint/2015/main" val="1"/>
-              </p:ext>
-            </p:extLst>
-          </p:nvPr>
-        </p:nvSpPr>
-        <p:spPr>
-          <a:xfrm>
-            <a:off x="8331468" y="164592"/>
-            <a:ext cx="3708894" cy="6540176"/>
-          </a:xfrm>
-          <a:prstGeom prst="rect">
-            <a:avLst/>
-          </a:prstGeom>
-          <a:noFill/>
-          <a:ln w="6350">
-            <a:solidFill>
-              <a:schemeClr val="tx1">
-                <a:lumMod val="75000"/>
-                <a:lumOff val="25000"/>
-              </a:schemeClr>
-            </a:solidFill>
-          </a:ln>
-        </p:spPr>
-        <p:style>
-          <a:lnRef idx="2">
-            <a:schemeClr val="accent1">
-              <a:shade val="50000"/>
-            </a:schemeClr>
-          </a:lnRef>
-          <a:fillRef idx="1">
-            <a:schemeClr val="accent1"/>
-          </a:fillRef>
-          <a:effectRef idx="0">
-            <a:schemeClr val="accent1"/>
-          </a:effectRef>
-          <a:fontRef idx="minor">
-            <a:schemeClr val="lt1"/>
-          </a:fontRef>
-        </p:style>
-        <p:txBody>
-          <a:bodyPr rtlCol="0" anchor="ctr"/>
-          <a:lstStyle/>
-          <a:p>
-            <a:pPr algn="ctr"/>
-            <a:endParaRPr lang="en-US"/>
-          </a:p>
-        </p:txBody>
-      </p:sp>
-      <p:sp>
-        <p:nvSpPr>
-          <p:cNvPr id="2" name="Title 1">
-            <a:extLst>
-              <a:ext uri="{FF2B5EF4-FFF2-40B4-BE49-F238E27FC236}">
-                <a16:creationId xmlns:a16="http://schemas.microsoft.com/office/drawing/2014/main" id="{92BA71F0-87C5-4431-946A-51318AECDDF6}"/>
-              </a:ext>
-            </a:extLst>
-          </p:cNvPr>
-          <p:cNvSpPr>
-            <a:spLocks noGrp="1"/>
-          </p:cNvSpPr>
-          <p:nvPr>
-            <p:ph type="title"/>
-          </p:nvPr>
-        </p:nvSpPr>
-        <p:spPr>
-          <a:xfrm>
-            <a:off x="8560024" y="1182454"/>
-            <a:ext cx="3238829" cy="3480794"/>
-          </a:xfrm>
-        </p:spPr>
-        <p:txBody>
-          <a:bodyPr vert="horz" lIns="91440" tIns="45720" rIns="91440" bIns="45720" rtlCol="0" anchor="ctr">
-            <a:normAutofit fontScale="90000"/>
-          </a:bodyPr>
-          <a:lstStyle/>
-          <a:p>
-            <a:pPr algn="ctr">
-              <a:lnSpc>
-                <a:spcPct val="83000"/>
-              </a:lnSpc>
-            </a:pPr>
-            <a:r>
-              <a:rPr lang="en-US" sz="4800" cap="all" spc="-100" dirty="0"/>
-              <a:t>How many times do we Write this?</a:t>
-            </a:r>
-          </a:p>
-        </p:txBody>
-      </p:sp>
-    </p:spTree>
-    <p:extLst>
-      <p:ext uri="{BB962C8B-B14F-4D97-AF65-F5344CB8AC3E}">
-        <p14:creationId xmlns:p14="http://schemas.microsoft.com/office/powerpoint/2010/main" val="2132252301"/>
-      </p:ext>
-    </p:extLst>
-  </p:cSld>
-  <p:clrMapOvr>
-    <a:overrideClrMapping bg1="dk1" tx1="lt1" bg2="dk2" tx2="lt2" accent1="accent1" accent2="accent2" accent3="accent3" accent4="accent4" accent5="accent5" accent6="accent6" hlink="hlink" folHlink="folHlink"/>
-  </p:clrMapOvr>
-</p:sld>
-</file>
-
 <file path=ppt/slides/slide5.xml><?xml version="1.0" encoding="utf-8"?>
 <p:sld xmlns:a="http://schemas.openxmlformats.org/drawingml/2006/main" xmlns:r="http://schemas.openxmlformats.org/officeDocument/2006/relationships" xmlns:p="http://schemas.openxmlformats.org/presentationml/2006/main">
   <p:cSld>
@@ -10152,6 +10154,241 @@
 <file path=ppt/slides/slide6.xml><?xml version="1.0" encoding="utf-8"?>
 <p:sld xmlns:a="http://schemas.openxmlformats.org/drawingml/2006/main" xmlns:r="http://schemas.openxmlformats.org/officeDocument/2006/relationships" xmlns:p="http://schemas.openxmlformats.org/presentationml/2006/main">
   <p:cSld>
+    <p:spTree>
+      <p:nvGrpSpPr>
+        <p:cNvPr id="1" name=""/>
+        <p:cNvGrpSpPr/>
+        <p:nvPr/>
+      </p:nvGrpSpPr>
+      <p:grpSpPr>
+        <a:xfrm>
+          <a:off x="0" y="0"/>
+          <a:ext cx="0" cy="0"/>
+          <a:chOff x="0" y="0"/>
+          <a:chExt cx="0" cy="0"/>
+        </a:xfrm>
+      </p:grpSpPr>
+      <p:sp>
+        <p:nvSpPr>
+          <p:cNvPr id="2" name="Title 1">
+            <a:extLst>
+              <a:ext uri="{FF2B5EF4-FFF2-40B4-BE49-F238E27FC236}">
+                <a16:creationId xmlns:a16="http://schemas.microsoft.com/office/drawing/2014/main" id="{87C208EA-BE5D-42BB-864E-B1E40FE80F22}"/>
+              </a:ext>
+            </a:extLst>
+          </p:cNvPr>
+          <p:cNvSpPr>
+            <a:spLocks noGrp="1"/>
+          </p:cNvSpPr>
+          <p:nvPr>
+            <p:ph type="title"/>
+          </p:nvPr>
+        </p:nvSpPr>
+        <p:spPr/>
+        <p:txBody>
+          <a:bodyPr/>
+          <a:lstStyle/>
+          <a:p>
+            <a:r>
+              <a:rPr lang="en-US" dirty="0"/>
+              <a:t>We can change it to something like this</a:t>
+            </a:r>
+          </a:p>
+        </p:txBody>
+      </p:sp>
+      <p:pic>
+        <p:nvPicPr>
+          <p:cNvPr id="5" name="Content Placeholder 4">
+            <a:extLst>
+              <a:ext uri="{FF2B5EF4-FFF2-40B4-BE49-F238E27FC236}">
+                <a16:creationId xmlns:a16="http://schemas.microsoft.com/office/drawing/2014/main" id="{618C2750-0BD4-4FA5-8125-239D6C5CCAF1}"/>
+              </a:ext>
+            </a:extLst>
+          </p:cNvPr>
+          <p:cNvPicPr>
+            <a:picLocks noGrp="1" noChangeAspect="1"/>
+          </p:cNvPicPr>
+          <p:nvPr>
+            <p:ph idx="1"/>
+          </p:nvPr>
+        </p:nvPicPr>
+        <p:blipFill>
+          <a:blip r:embed="rId2"/>
+          <a:stretch>
+            <a:fillRect/>
+          </a:stretch>
+        </p:blipFill>
+        <p:spPr>
+          <a:xfrm>
+            <a:off x="1287841" y="2330075"/>
+            <a:ext cx="4978656" cy="1238314"/>
+          </a:xfrm>
+        </p:spPr>
+      </p:pic>
+      <p:pic>
+        <p:nvPicPr>
+          <p:cNvPr id="7" name="Picture 6">
+            <a:extLst>
+              <a:ext uri="{FF2B5EF4-FFF2-40B4-BE49-F238E27FC236}">
+                <a16:creationId xmlns:a16="http://schemas.microsoft.com/office/drawing/2014/main" id="{AAA085BE-47E2-4BAD-AE03-6219E1BC1AAF}"/>
+              </a:ext>
+            </a:extLst>
+          </p:cNvPr>
+          <p:cNvPicPr>
+            <a:picLocks noChangeAspect="1"/>
+          </p:cNvPicPr>
+          <p:nvPr/>
+        </p:nvPicPr>
+        <p:blipFill>
+          <a:blip r:embed="rId3"/>
+          <a:stretch>
+            <a:fillRect/>
+          </a:stretch>
+        </p:blipFill>
+        <p:spPr>
+          <a:xfrm>
+            <a:off x="1532545" y="4748453"/>
+            <a:ext cx="2540131" cy="1174810"/>
+          </a:xfrm>
+          <a:prstGeom prst="rect">
+            <a:avLst/>
+          </a:prstGeom>
+        </p:spPr>
+      </p:pic>
+    </p:spTree>
+    <p:extLst>
+      <p:ext uri="{BB962C8B-B14F-4D97-AF65-F5344CB8AC3E}">
+        <p14:creationId xmlns:p14="http://schemas.microsoft.com/office/powerpoint/2010/main" val="1446801790"/>
+      </p:ext>
+    </p:extLst>
+  </p:cSld>
+  <p:clrMapOvr>
+    <a:masterClrMapping/>
+  </p:clrMapOvr>
+</p:sld>
+</file>
+
+<file path=ppt/slides/slide7.xml><?xml version="1.0" encoding="utf-8"?>
+<p:sld xmlns:a="http://schemas.openxmlformats.org/drawingml/2006/main" xmlns:r="http://schemas.openxmlformats.org/officeDocument/2006/relationships" xmlns:p="http://schemas.openxmlformats.org/presentationml/2006/main">
+  <p:cSld>
+    <p:spTree>
+      <p:nvGrpSpPr>
+        <p:cNvPr id="1" name=""/>
+        <p:cNvGrpSpPr/>
+        <p:nvPr/>
+      </p:nvGrpSpPr>
+      <p:grpSpPr>
+        <a:xfrm>
+          <a:off x="0" y="0"/>
+          <a:ext cx="0" cy="0"/>
+          <a:chOff x="0" y="0"/>
+          <a:chExt cx="0" cy="0"/>
+        </a:xfrm>
+      </p:grpSpPr>
+      <p:sp>
+        <p:nvSpPr>
+          <p:cNvPr id="2" name="Title 1">
+            <a:extLst>
+              <a:ext uri="{FF2B5EF4-FFF2-40B4-BE49-F238E27FC236}">
+                <a16:creationId xmlns:a16="http://schemas.microsoft.com/office/drawing/2014/main" id="{05B3AC4C-E938-4173-AC56-077EE7F49A56}"/>
+              </a:ext>
+            </a:extLst>
+          </p:cNvPr>
+          <p:cNvSpPr>
+            <a:spLocks noGrp="1"/>
+          </p:cNvSpPr>
+          <p:nvPr>
+            <p:ph type="title"/>
+          </p:nvPr>
+        </p:nvSpPr>
+        <p:spPr/>
+        <p:txBody>
+          <a:bodyPr/>
+          <a:lstStyle/>
+          <a:p>
+            <a:r>
+              <a:rPr lang="en-US" dirty="0"/>
+              <a:t>Or in a more reusable fashion</a:t>
+            </a:r>
+          </a:p>
+        </p:txBody>
+      </p:sp>
+      <p:pic>
+        <p:nvPicPr>
+          <p:cNvPr id="7" name="Picture 6">
+            <a:extLst>
+              <a:ext uri="{FF2B5EF4-FFF2-40B4-BE49-F238E27FC236}">
+                <a16:creationId xmlns:a16="http://schemas.microsoft.com/office/drawing/2014/main" id="{5E66C197-5F36-485D-9553-B7A35262F8BD}"/>
+              </a:ext>
+            </a:extLst>
+          </p:cNvPr>
+          <p:cNvPicPr>
+            <a:picLocks noChangeAspect="1"/>
+          </p:cNvPicPr>
+          <p:nvPr/>
+        </p:nvPicPr>
+        <p:blipFill>
+          <a:blip r:embed="rId2"/>
+          <a:stretch>
+            <a:fillRect/>
+          </a:stretch>
+        </p:blipFill>
+        <p:spPr>
+          <a:xfrm>
+            <a:off x="1256114" y="3806705"/>
+            <a:ext cx="9754550" cy="1178250"/>
+          </a:xfrm>
+          <a:prstGeom prst="rect">
+            <a:avLst/>
+          </a:prstGeom>
+        </p:spPr>
+      </p:pic>
+      <p:pic>
+        <p:nvPicPr>
+          <p:cNvPr id="11" name="Picture 10">
+            <a:extLst>
+              <a:ext uri="{FF2B5EF4-FFF2-40B4-BE49-F238E27FC236}">
+                <a16:creationId xmlns:a16="http://schemas.microsoft.com/office/drawing/2014/main" id="{D061C08C-9101-43AA-BED3-7C6A496333C1}"/>
+              </a:ext>
+            </a:extLst>
+          </p:cNvPr>
+          <p:cNvPicPr>
+            <a:picLocks noChangeAspect="1"/>
+          </p:cNvPicPr>
+          <p:nvPr/>
+        </p:nvPicPr>
+        <p:blipFill>
+          <a:blip r:embed="rId3"/>
+          <a:stretch>
+            <a:fillRect/>
+          </a:stretch>
+        </p:blipFill>
+        <p:spPr>
+          <a:xfrm>
+            <a:off x="1155290" y="1832690"/>
+            <a:ext cx="5941634" cy="1526669"/>
+          </a:xfrm>
+          <a:prstGeom prst="rect">
+            <a:avLst/>
+          </a:prstGeom>
+        </p:spPr>
+      </p:pic>
+    </p:spTree>
+    <p:extLst>
+      <p:ext uri="{BB962C8B-B14F-4D97-AF65-F5344CB8AC3E}">
+        <p14:creationId xmlns:p14="http://schemas.microsoft.com/office/powerpoint/2010/main" val="2305431762"/>
+      </p:ext>
+    </p:extLst>
+  </p:cSld>
+  <p:clrMapOvr>
+    <a:masterClrMapping/>
+  </p:clrMapOvr>
+</p:sld>
+</file>
+
+<file path=ppt/slides/slide8.xml><?xml version="1.0" encoding="utf-8"?>
+<p:sld xmlns:a="http://schemas.openxmlformats.org/drawingml/2006/main" xmlns:r="http://schemas.openxmlformats.org/officeDocument/2006/relationships" xmlns:p="http://schemas.openxmlformats.org/presentationml/2006/main">
+  <p:cSld>
     <p:bg>
       <p:bgPr>
         <a:solidFill>
@@ -10411,7 +10648,7 @@
 </p:sld>
 </file>
 
-<file path=ppt/slides/slide7.xml><?xml version="1.0" encoding="utf-8"?>
+<file path=ppt/slides/slide9.xml><?xml version="1.0" encoding="utf-8"?>
 <p:sld xmlns:a="http://schemas.openxmlformats.org/drawingml/2006/main" xmlns:r="http://schemas.openxmlformats.org/officeDocument/2006/relationships" xmlns:p="http://schemas.openxmlformats.org/presentationml/2006/main">
   <p:cSld>
     <p:spTree>
@@ -10860,6 +11097,24 @@
 </file>
 
 <file path=customXml/item1.xml><?xml version="1.0" encoding="utf-8"?>
+<?mso-contentType ?>
+<FormTemplates xmlns="http://schemas.microsoft.com/sharepoint/v3/contenttype/forms">
+  <Display>DocumentLibraryForm</Display>
+  <Edit>DocumentLibraryForm</Edit>
+  <New>DocumentLibraryForm</New>
+</FormTemplates>
+</file>
+
+<file path=customXml/item2.xml><?xml version="1.0" encoding="utf-8"?>
+<p:properties xmlns:p="http://schemas.microsoft.com/office/2006/metadata/properties" xmlns:xsi="http://www.w3.org/2001/XMLSchema-instance" xmlns:pc="http://schemas.microsoft.com/office/infopath/2007/PartnerControls">
+  <documentManagement>
+    <Status xmlns="71af3243-3dd4-4a8d-8c0d-dd76da1f02a5">Not started</Status>
+    <MediaServiceKeyPoints xmlns="71af3243-3dd4-4a8d-8c0d-dd76da1f02a5" xsi:nil="true"/>
+  </documentManagement>
+</p:properties>
+</file>
+
+<file path=customXml/item3.xml><?xml version="1.0" encoding="utf-8"?>
 <ct:contentTypeSchema xmlns:ct="http://schemas.microsoft.com/office/2006/metadata/contentType" xmlns:ma="http://schemas.microsoft.com/office/2006/metadata/properties/metaAttributes" ct:_="" ma:_="" ma:contentTypeName="Document" ma:contentTypeID="0x01010079F111ED35F8CC479449609E8A0923A6" ma:contentTypeVersion="12" ma:contentTypeDescription="Create a new document." ma:contentTypeScope="" ma:versionID="a410dd7f93c95333ffa1b60ed6adedd1">
   <xsd:schema xmlns:xsd="http://www.w3.org/2001/XMLSchema" xmlns:xs="http://www.w3.org/2001/XMLSchema" xmlns:p="http://schemas.microsoft.com/office/2006/metadata/properties" xmlns:ns2="71af3243-3dd4-4a8d-8c0d-dd76da1f02a5" xmlns:ns3="16c05727-aa75-4e4a-9b5f-8a80a1165891" targetNamespace="http://schemas.microsoft.com/office/2006/metadata/properties" ma:root="true" ma:fieldsID="a936d9baba76aa3866493feff160faab" ns2:_="" ns3:_="">
     <xsd:import namespace="71af3243-3dd4-4a8d-8c0d-dd76da1f02a5"/>
@@ -11080,25 +11335,25 @@
 </ct:contentTypeSchema>
 </file>
 
-<file path=customXml/item2.xml><?xml version="1.0" encoding="utf-8"?>
-<p:properties xmlns:p="http://schemas.microsoft.com/office/2006/metadata/properties" xmlns:xsi="http://www.w3.org/2001/XMLSchema-instance" xmlns:pc="http://schemas.microsoft.com/office/infopath/2007/PartnerControls">
-  <documentManagement>
-    <Status xmlns="71af3243-3dd4-4a8d-8c0d-dd76da1f02a5">Not started</Status>
-    <MediaServiceKeyPoints xmlns="71af3243-3dd4-4a8d-8c0d-dd76da1f02a5" xsi:nil="true"/>
-  </documentManagement>
-</p:properties>
+<file path=customXml/itemProps1.xml><?xml version="1.0" encoding="utf-8"?>
+<ds:datastoreItem xmlns:ds="http://schemas.openxmlformats.org/officeDocument/2006/customXml" ds:itemID="{AE2713E1-6312-427E-BFCB-C5A5DA301373}">
+  <ds:schemaRefs>
+    <ds:schemaRef ds:uri="http://schemas.microsoft.com/sharepoint/v3/contenttype/forms"/>
+  </ds:schemaRefs>
+</ds:datastoreItem>
 </file>
 
-<file path=customXml/item3.xml><?xml version="1.0" encoding="utf-8"?>
-<?mso-contentType ?>
-<FormTemplates xmlns="http://schemas.microsoft.com/sharepoint/v3/contenttype/forms">
-  <Display>DocumentLibraryForm</Display>
-  <Edit>DocumentLibraryForm</Edit>
-  <New>DocumentLibraryForm</New>
-</FormTemplates>
+<file path=customXml/itemProps2.xml><?xml version="1.0" encoding="utf-8"?>
+<ds:datastoreItem xmlns:ds="http://schemas.openxmlformats.org/officeDocument/2006/customXml" ds:itemID="{52F3B215-496E-4790-A364-7C1C46DEC771}">
+  <ds:schemaRefs>
+    <ds:schemaRef ds:uri="http://schemas.microsoft.com/office/2006/metadata/properties"/>
+    <ds:schemaRef ds:uri="http://schemas.microsoft.com/office/infopath/2007/PartnerControls"/>
+    <ds:schemaRef ds:uri="71af3243-3dd4-4a8d-8c0d-dd76da1f02a5"/>
+  </ds:schemaRefs>
+</ds:datastoreItem>
 </file>
 
-<file path=customXml/itemProps1.xml><?xml version="1.0" encoding="utf-8"?>
+<file path=customXml/itemProps3.xml><?xml version="1.0" encoding="utf-8"?>
 <ds:datastoreItem xmlns:ds="http://schemas.openxmlformats.org/officeDocument/2006/customXml" ds:itemID="{50DB95DD-0319-4EE5-8C5C-9CEDF75E024B}">
   <ds:schemaRefs>
     <ds:schemaRef ds:uri="http://schemas.microsoft.com/office/2006/metadata/contentType"/>
@@ -11115,22 +11370,4 @@
     <ds:schemaRef ds:uri="http://schemas.microsoft.com/internal/obd"/>
   </ds:schemaRefs>
 </ds:datastoreItem>
-</file>
-
-<file path=customXml/itemProps2.xml><?xml version="1.0" encoding="utf-8"?>
-<ds:datastoreItem xmlns:ds="http://schemas.openxmlformats.org/officeDocument/2006/customXml" ds:itemID="{52F3B215-496E-4790-A364-7C1C46DEC771}">
-  <ds:schemaRefs>
-    <ds:schemaRef ds:uri="http://schemas.microsoft.com/office/2006/metadata/properties"/>
-    <ds:schemaRef ds:uri="http://schemas.microsoft.com/office/infopath/2007/PartnerControls"/>
-    <ds:schemaRef ds:uri="71af3243-3dd4-4a8d-8c0d-dd76da1f02a5"/>
-  </ds:schemaRefs>
-</ds:datastoreItem>
-</file>
-
-<file path=customXml/itemProps3.xml><?xml version="1.0" encoding="utf-8"?>
-<ds:datastoreItem xmlns:ds="http://schemas.openxmlformats.org/officeDocument/2006/customXml" ds:itemID="{AE2713E1-6312-427E-BFCB-C5A5DA301373}">
-  <ds:schemaRefs>
-    <ds:schemaRef ds:uri="http://schemas.microsoft.com/sharepoint/v3/contenttype/forms"/>
-  </ds:schemaRefs>
-</ds:datastoreItem>
 </file>
</xml_diff>